<commit_message>
Updating slides and r code
</commit_message>
<xml_diff>
--- a/ggplot and the Grammar of Graphics.pptx
+++ b/ggplot and the Grammar of Graphics.pptx
@@ -5,7 +5,7 @@
     <p:sldMasterId id="2147483719" r:id="rId4"/>
   </p:sldMasterIdLst>
   <p:notesMasterIdLst>
-    <p:notesMasterId r:id="rId19"/>
+    <p:notesMasterId r:id="rId23"/>
   </p:notesMasterIdLst>
   <p:sldIdLst>
     <p:sldId id="256" r:id="rId5"/>
@@ -14,19 +14,23 @@
     <p:sldId id="268" r:id="rId8"/>
     <p:sldId id="269" r:id="rId9"/>
     <p:sldId id="270" r:id="rId10"/>
-    <p:sldId id="257" r:id="rId11"/>
-    <p:sldId id="263" r:id="rId12"/>
-    <p:sldId id="258" r:id="rId13"/>
-    <p:sldId id="260" r:id="rId14"/>
-    <p:sldId id="262" r:id="rId15"/>
-    <p:sldId id="264" r:id="rId16"/>
-    <p:sldId id="265" r:id="rId17"/>
-    <p:sldId id="271" r:id="rId18"/>
+    <p:sldId id="273" r:id="rId11"/>
+    <p:sldId id="257" r:id="rId12"/>
+    <p:sldId id="263" r:id="rId13"/>
+    <p:sldId id="274" r:id="rId14"/>
+    <p:sldId id="258" r:id="rId15"/>
+    <p:sldId id="260" r:id="rId16"/>
+    <p:sldId id="262" r:id="rId17"/>
+    <p:sldId id="264" r:id="rId18"/>
+    <p:sldId id="275" r:id="rId19"/>
+    <p:sldId id="272" r:id="rId20"/>
+    <p:sldId id="265" r:id="rId21"/>
+    <p:sldId id="271" r:id="rId22"/>
   </p:sldIdLst>
   <p:sldSz cx="12192000" cy="6858000"/>
   <p:notesSz cx="6858000" cy="9144000"/>
   <p:custDataLst>
-    <p:tags r:id="rId20"/>
+    <p:tags r:id="rId24"/>
   </p:custDataLst>
   <p:defaultTextStyle>
     <a:defPPr>
@@ -209,7 +213,7 @@
 <file path=ppt/revisionInfo.xml><?xml version="1.0" encoding="utf-8"?>
 <p1510:revInfo xmlns:a="http://schemas.openxmlformats.org/drawingml/2006/main" xmlns:r="http://schemas.openxmlformats.org/officeDocument/2006/relationships" xmlns:p1510="http://schemas.microsoft.com/office/powerpoint/2015/10/main">
   <p1510:revLst>
-    <p1510:client id="{FFCD0A21-B60C-4C83-BEEE-618EB3FB92CB}" v="277" dt="2025-12-30T21:24:11.046"/>
+    <p1510:client id="{C83996E3-EE05-4127-8D33-CB4AECB28852}" v="89" dt="2026-01-13T20:55:33.968"/>
   </p1510:revLst>
 </p1510:revInfo>
 </file>
@@ -219,237 +223,10 @@
   <pc:docChgLst>
     <pc:chgData name="Russell, Brittany" userId="cb15f705-d373-4cb5-ba99-29bd5142b341" providerId="ADAL" clId="{373FFD21-6881-4AE2-914D-683D04AB4F94}"/>
     <pc:docChg chg="undo custSel addSld delSld modSld sldOrd">
-      <pc:chgData name="Russell, Brittany" userId="cb15f705-d373-4cb5-ba99-29bd5142b341" providerId="ADAL" clId="{373FFD21-6881-4AE2-914D-683D04AB4F94}" dt="2025-12-31T00:49:59.352" v="10216" actId="478"/>
+      <pc:chgData name="Russell, Brittany" userId="cb15f705-d373-4cb5-ba99-29bd5142b341" providerId="ADAL" clId="{373FFD21-6881-4AE2-914D-683D04AB4F94}" dt="2026-01-13T20:55:52.030" v="11672" actId="20577"/>
       <pc:docMkLst>
         <pc:docMk/>
       </pc:docMkLst>
-      <pc:sldChg chg="addSp delSp modSp mod">
-        <pc:chgData name="Russell, Brittany" userId="cb15f705-d373-4cb5-ba99-29bd5142b341" providerId="ADAL" clId="{373FFD21-6881-4AE2-914D-683D04AB4F94}" dt="2025-12-05T23:08:28.607" v="1089"/>
-        <pc:sldMkLst>
-          <pc:docMk/>
-          <pc:sldMk cId="4082113599" sldId="256"/>
-        </pc:sldMkLst>
-        <pc:spChg chg="mod">
-          <ac:chgData name="Russell, Brittany" userId="cb15f705-d373-4cb5-ba99-29bd5142b341" providerId="ADAL" clId="{373FFD21-6881-4AE2-914D-683D04AB4F94}" dt="2025-12-05T23:08:28.553" v="1065" actId="948"/>
-          <ac:spMkLst>
-            <pc:docMk/>
-            <pc:sldMk cId="4082113599" sldId="256"/>
-            <ac:spMk id="2" creationId="{5567EBBF-7EBE-7DC2-DE09-BF873B78310A}"/>
-          </ac:spMkLst>
-        </pc:spChg>
-        <pc:graphicFrameChg chg="mod">
-          <ac:chgData name="Russell, Brittany" userId="cb15f705-d373-4cb5-ba99-29bd5142b341" providerId="ADAL" clId="{373FFD21-6881-4AE2-914D-683D04AB4F94}" dt="2025-12-05T23:08:28.607" v="1089"/>
-          <ac:graphicFrameMkLst>
-            <pc:docMk/>
-            <pc:sldMk cId="4082113599" sldId="256"/>
-            <ac:graphicFrameMk id="3" creationId="{4D369280-2BFD-64A7-FAA7-127EFE40D431}"/>
-          </ac:graphicFrameMkLst>
-        </pc:graphicFrameChg>
-      </pc:sldChg>
-      <pc:sldChg chg="modSp mod">
-        <pc:chgData name="Russell, Brittany" userId="cb15f705-d373-4cb5-ba99-29bd5142b341" providerId="ADAL" clId="{373FFD21-6881-4AE2-914D-683D04AB4F94}" dt="2025-12-05T23:09:40.593" v="1123" actId="20577"/>
-        <pc:sldMkLst>
-          <pc:docMk/>
-          <pc:sldMk cId="2049715468" sldId="257"/>
-        </pc:sldMkLst>
-        <pc:spChg chg="mod">
-          <ac:chgData name="Russell, Brittany" userId="cb15f705-d373-4cb5-ba99-29bd5142b341" providerId="ADAL" clId="{373FFD21-6881-4AE2-914D-683D04AB4F94}" dt="2025-12-05T23:09:40.593" v="1123" actId="20577"/>
-          <ac:spMkLst>
-            <pc:docMk/>
-            <pc:sldMk cId="2049715468" sldId="257"/>
-            <ac:spMk id="4" creationId="{0C3C21A2-85DE-0FC1-BC6E-EB8F51807180}"/>
-          </ac:spMkLst>
-        </pc:spChg>
-      </pc:sldChg>
-      <pc:sldChg chg="del mod modShow">
-        <pc:chgData name="Russell, Brittany" userId="cb15f705-d373-4cb5-ba99-29bd5142b341" providerId="ADAL" clId="{373FFD21-6881-4AE2-914D-683D04AB4F94}" dt="2025-12-30T21:04:22.566" v="5846" actId="2696"/>
-        <pc:sldMkLst>
-          <pc:docMk/>
-          <pc:sldMk cId="3279142703" sldId="259"/>
-        </pc:sldMkLst>
-      </pc:sldChg>
-      <pc:sldChg chg="addSp delSp modSp mod">
-        <pc:chgData name="Russell, Brittany" userId="cb15f705-d373-4cb5-ba99-29bd5142b341" providerId="ADAL" clId="{373FFD21-6881-4AE2-914D-683D04AB4F94}" dt="2025-12-05T23:29:22.996" v="3610"/>
-        <pc:sldMkLst>
-          <pc:docMk/>
-          <pc:sldMk cId="2625623342" sldId="260"/>
-        </pc:sldMkLst>
-        <pc:spChg chg="mod">
-          <ac:chgData name="Russell, Brittany" userId="cb15f705-d373-4cb5-ba99-29bd5142b341" providerId="ADAL" clId="{373FFD21-6881-4AE2-914D-683D04AB4F94}" dt="2025-12-05T23:29:22.941" v="3586" actId="948"/>
-          <ac:spMkLst>
-            <pc:docMk/>
-            <pc:sldMk cId="2625623342" sldId="260"/>
-            <ac:spMk id="2" creationId="{41028BF5-1FF8-95C2-EFE5-382469171F8D}"/>
-          </ac:spMkLst>
-        </pc:spChg>
-        <pc:spChg chg="mod">
-          <ac:chgData name="Russell, Brittany" userId="cb15f705-d373-4cb5-ba99-29bd5142b341" providerId="ADAL" clId="{373FFD21-6881-4AE2-914D-683D04AB4F94}" dt="2025-12-05T23:23:17.051" v="2379" actId="1076"/>
-          <ac:spMkLst>
-            <pc:docMk/>
-            <pc:sldMk cId="2625623342" sldId="260"/>
-            <ac:spMk id="17" creationId="{8BB070BD-C755-18C2-C6E7-4A490F90B750}"/>
-          </ac:spMkLst>
-        </pc:spChg>
-        <pc:spChg chg="mod">
-          <ac:chgData name="Russell, Brittany" userId="cb15f705-d373-4cb5-ba99-29bd5142b341" providerId="ADAL" clId="{373FFD21-6881-4AE2-914D-683D04AB4F94}" dt="2025-12-05T23:23:17.051" v="2379" actId="1076"/>
-          <ac:spMkLst>
-            <pc:docMk/>
-            <pc:sldMk cId="2625623342" sldId="260"/>
-            <ac:spMk id="18" creationId="{58D68528-1F25-CDDE-13DC-00C2028EAA5A}"/>
-          </ac:spMkLst>
-        </pc:spChg>
-        <pc:spChg chg="mod">
-          <ac:chgData name="Russell, Brittany" userId="cb15f705-d373-4cb5-ba99-29bd5142b341" providerId="ADAL" clId="{373FFD21-6881-4AE2-914D-683D04AB4F94}" dt="2025-12-05T23:23:17.051" v="2379" actId="1076"/>
-          <ac:spMkLst>
-            <pc:docMk/>
-            <pc:sldMk cId="2625623342" sldId="260"/>
-            <ac:spMk id="19" creationId="{82483C96-2AC8-F145-9745-E2BFD8435C85}"/>
-          </ac:spMkLst>
-        </pc:spChg>
-        <pc:spChg chg="mod">
-          <ac:chgData name="Russell, Brittany" userId="cb15f705-d373-4cb5-ba99-29bd5142b341" providerId="ADAL" clId="{373FFD21-6881-4AE2-914D-683D04AB4F94}" dt="2025-12-05T23:23:17.051" v="2379" actId="1076"/>
-          <ac:spMkLst>
-            <pc:docMk/>
-            <pc:sldMk cId="2625623342" sldId="260"/>
-            <ac:spMk id="20" creationId="{AEEA86EB-D2D7-0DCA-5A44-6F346D1B8275}"/>
-          </ac:spMkLst>
-        </pc:spChg>
-        <pc:spChg chg="mod">
-          <ac:chgData name="Russell, Brittany" userId="cb15f705-d373-4cb5-ba99-29bd5142b341" providerId="ADAL" clId="{373FFD21-6881-4AE2-914D-683D04AB4F94}" dt="2025-12-05T23:23:17.051" v="2379" actId="1076"/>
-          <ac:spMkLst>
-            <pc:docMk/>
-            <pc:sldMk cId="2625623342" sldId="260"/>
-            <ac:spMk id="21" creationId="{13EE0098-BC8F-808A-09F6-5D517D1480D8}"/>
-          </ac:spMkLst>
-        </pc:spChg>
-        <pc:spChg chg="mod">
-          <ac:chgData name="Russell, Brittany" userId="cb15f705-d373-4cb5-ba99-29bd5142b341" providerId="ADAL" clId="{373FFD21-6881-4AE2-914D-683D04AB4F94}" dt="2025-12-05T23:23:27.062" v="2380" actId="1076"/>
-          <ac:spMkLst>
-            <pc:docMk/>
-            <pc:sldMk cId="2625623342" sldId="260"/>
-            <ac:spMk id="22" creationId="{1912C712-BE95-B3AB-CF77-1E471F0E2321}"/>
-          </ac:spMkLst>
-        </pc:spChg>
-        <pc:spChg chg="mod">
-          <ac:chgData name="Russell, Brittany" userId="cb15f705-d373-4cb5-ba99-29bd5142b341" providerId="ADAL" clId="{373FFD21-6881-4AE2-914D-683D04AB4F94}" dt="2025-12-05T23:23:17.051" v="2379" actId="1076"/>
-          <ac:spMkLst>
-            <pc:docMk/>
-            <pc:sldMk cId="2625623342" sldId="260"/>
-            <ac:spMk id="23" creationId="{146D3A54-007B-A24F-364F-AB90E02F2098}"/>
-          </ac:spMkLst>
-        </pc:spChg>
-        <pc:spChg chg="mod">
-          <ac:chgData name="Russell, Brittany" userId="cb15f705-d373-4cb5-ba99-29bd5142b341" providerId="ADAL" clId="{373FFD21-6881-4AE2-914D-683D04AB4F94}" dt="2025-12-05T23:22:59.998" v="2378" actId="1076"/>
-          <ac:spMkLst>
-            <pc:docMk/>
-            <pc:sldMk cId="2625623342" sldId="260"/>
-            <ac:spMk id="24" creationId="{39A11150-8A99-39E7-5219-8EDACCF32D62}"/>
-          </ac:spMkLst>
-        </pc:spChg>
-        <pc:spChg chg="mod">
-          <ac:chgData name="Russell, Brittany" userId="cb15f705-d373-4cb5-ba99-29bd5142b341" providerId="ADAL" clId="{373FFD21-6881-4AE2-914D-683D04AB4F94}" dt="2025-12-05T23:25:28.766" v="2676" actId="1076"/>
-          <ac:spMkLst>
-            <pc:docMk/>
-            <pc:sldMk cId="2625623342" sldId="260"/>
-            <ac:spMk id="25" creationId="{D115BD16-589B-7536-C136-4C508A10248B}"/>
-          </ac:spMkLst>
-        </pc:spChg>
-        <pc:spChg chg="mod">
-          <ac:chgData name="Russell, Brittany" userId="cb15f705-d373-4cb5-ba99-29bd5142b341" providerId="ADAL" clId="{373FFD21-6881-4AE2-914D-683D04AB4F94}" dt="2025-12-05T23:23:52.836" v="2385" actId="1076"/>
-          <ac:spMkLst>
-            <pc:docMk/>
-            <pc:sldMk cId="2625623342" sldId="260"/>
-            <ac:spMk id="26" creationId="{4298AD37-EA7A-BC0C-7FBD-B89F0B9CAC1B}"/>
-          </ac:spMkLst>
-        </pc:spChg>
-        <pc:graphicFrameChg chg="mod">
-          <ac:chgData name="Russell, Brittany" userId="cb15f705-d373-4cb5-ba99-29bd5142b341" providerId="ADAL" clId="{373FFD21-6881-4AE2-914D-683D04AB4F94}" dt="2025-12-05T23:29:22.996" v="3610"/>
-          <ac:graphicFrameMkLst>
-            <pc:docMk/>
-            <pc:sldMk cId="2625623342" sldId="260"/>
-            <ac:graphicFrameMk id="6" creationId="{065855C6-BB9E-C603-1A66-7D96E28728A2}"/>
-          </ac:graphicFrameMkLst>
-        </pc:graphicFrameChg>
-        <pc:cxnChg chg="add mod">
-          <ac:chgData name="Russell, Brittany" userId="cb15f705-d373-4cb5-ba99-29bd5142b341" providerId="ADAL" clId="{373FFD21-6881-4AE2-914D-683D04AB4F94}" dt="2025-12-05T23:22:59.998" v="2378" actId="1076"/>
-          <ac:cxnSpMkLst>
-            <pc:docMk/>
-            <pc:sldMk cId="2625623342" sldId="260"/>
-            <ac:cxnSpMk id="29" creationId="{2D2792A0-9F8F-E441-0A2D-4E7EBE1641C2}"/>
-          </ac:cxnSpMkLst>
-        </pc:cxnChg>
-        <pc:cxnChg chg="add mod">
-          <ac:chgData name="Russell, Brittany" userId="cb15f705-d373-4cb5-ba99-29bd5142b341" providerId="ADAL" clId="{373FFD21-6881-4AE2-914D-683D04AB4F94}" dt="2025-12-05T23:22:59.998" v="2378" actId="1076"/>
-          <ac:cxnSpMkLst>
-            <pc:docMk/>
-            <pc:sldMk cId="2625623342" sldId="260"/>
-            <ac:cxnSpMk id="30" creationId="{BCB2DA5C-DEA8-A046-7AB2-ACE32C6CF6BB}"/>
-          </ac:cxnSpMkLst>
-        </pc:cxnChg>
-        <pc:cxnChg chg="add mod">
-          <ac:chgData name="Russell, Brittany" userId="cb15f705-d373-4cb5-ba99-29bd5142b341" providerId="ADAL" clId="{373FFD21-6881-4AE2-914D-683D04AB4F94}" dt="2025-12-05T23:25:28.766" v="2676" actId="1076"/>
-          <ac:cxnSpMkLst>
-            <pc:docMk/>
-            <pc:sldMk cId="2625623342" sldId="260"/>
-            <ac:cxnSpMk id="36" creationId="{531FAC49-ADE6-D6CE-64BA-9DCCC9FA3A05}"/>
-          </ac:cxnSpMkLst>
-        </pc:cxnChg>
-        <pc:cxnChg chg="add mod">
-          <ac:chgData name="Russell, Brittany" userId="cb15f705-d373-4cb5-ba99-29bd5142b341" providerId="ADAL" clId="{373FFD21-6881-4AE2-914D-683D04AB4F94}" dt="2025-12-05T23:25:28.766" v="2676" actId="1076"/>
-          <ac:cxnSpMkLst>
-            <pc:docMk/>
-            <pc:sldMk cId="2625623342" sldId="260"/>
-            <ac:cxnSpMk id="39" creationId="{C6A091F2-19F6-7C6C-F0B7-7483AE5B835D}"/>
-          </ac:cxnSpMkLst>
-        </pc:cxnChg>
-        <pc:cxnChg chg="add mod">
-          <ac:chgData name="Russell, Brittany" userId="cb15f705-d373-4cb5-ba99-29bd5142b341" providerId="ADAL" clId="{373FFD21-6881-4AE2-914D-683D04AB4F94}" dt="2025-12-05T23:25:28.766" v="2676" actId="1076"/>
-          <ac:cxnSpMkLst>
-            <pc:docMk/>
-            <pc:sldMk cId="2625623342" sldId="260"/>
-            <ac:cxnSpMk id="42" creationId="{DF8EF6A0-BDB2-D238-3648-61BB72CB12A7}"/>
-          </ac:cxnSpMkLst>
-        </pc:cxnChg>
-        <pc:cxnChg chg="add mod">
-          <ac:chgData name="Russell, Brittany" userId="cb15f705-d373-4cb5-ba99-29bd5142b341" providerId="ADAL" clId="{373FFD21-6881-4AE2-914D-683D04AB4F94}" dt="2025-12-05T23:23:52.836" v="2385" actId="1076"/>
-          <ac:cxnSpMkLst>
-            <pc:docMk/>
-            <pc:sldMk cId="2625623342" sldId="260"/>
-            <ac:cxnSpMk id="45" creationId="{854CEA9A-DD18-4BA3-8851-AEE19E8F90DC}"/>
-          </ac:cxnSpMkLst>
-        </pc:cxnChg>
-      </pc:sldChg>
-      <pc:sldChg chg="addSp delSp modSp mod">
-        <pc:chgData name="Russell, Brittany" userId="cb15f705-d373-4cb5-ba99-29bd5142b341" providerId="ADAL" clId="{373FFD21-6881-4AE2-914D-683D04AB4F94}" dt="2025-12-29T21:34:30.176" v="4878" actId="20577"/>
-        <pc:sldMkLst>
-          <pc:docMk/>
-          <pc:sldMk cId="2925928326" sldId="261"/>
-        </pc:sldMkLst>
-        <pc:spChg chg="mod">
-          <ac:chgData name="Russell, Brittany" userId="cb15f705-d373-4cb5-ba99-29bd5142b341" providerId="ADAL" clId="{373FFD21-6881-4AE2-914D-683D04AB4F94}" dt="2025-12-05T23:10:02.351" v="1251" actId="948"/>
-          <ac:spMkLst>
-            <pc:docMk/>
-            <pc:sldMk cId="2925928326" sldId="261"/>
-            <ac:spMk id="2" creationId="{BBAB90E9-94EF-E1D6-C49C-D891095F80E0}"/>
-          </ac:spMkLst>
-        </pc:spChg>
-        <pc:spChg chg="mod">
-          <ac:chgData name="Russell, Brittany" userId="cb15f705-d373-4cb5-ba99-29bd5142b341" providerId="ADAL" clId="{373FFD21-6881-4AE2-914D-683D04AB4F94}" dt="2025-12-29T21:34:30.176" v="4878" actId="20577"/>
-          <ac:spMkLst>
-            <pc:docMk/>
-            <pc:sldMk cId="2925928326" sldId="261"/>
-            <ac:spMk id="4" creationId="{577F3709-AF58-E8F8-B2B8-76180D69F94D}"/>
-          </ac:spMkLst>
-        </pc:spChg>
-        <pc:graphicFrameChg chg="mod">
-          <ac:chgData name="Russell, Brittany" userId="cb15f705-d373-4cb5-ba99-29bd5142b341" providerId="ADAL" clId="{373FFD21-6881-4AE2-914D-683D04AB4F94}" dt="2025-12-05T23:10:02.400" v="1275"/>
-          <ac:graphicFrameMkLst>
-            <pc:docMk/>
-            <pc:sldMk cId="2925928326" sldId="261"/>
-            <ac:graphicFrameMk id="6" creationId="{4DF18903-B90C-C0AC-31EE-65FBDB5EF65A}"/>
-          </ac:graphicFrameMkLst>
-        </pc:graphicFrameChg>
-      </pc:sldChg>
       <pc:sldChg chg="addSp delSp modSp new mod">
         <pc:chgData name="Russell, Brittany" userId="cb15f705-d373-4cb5-ba99-29bd5142b341" providerId="ADAL" clId="{373FFD21-6881-4AE2-914D-683D04AB4F94}" dt="2025-12-29T21:31:58.305" v="4537" actId="478"/>
         <pc:sldMkLst>
@@ -462,14 +239,6 @@
             <pc:docMk/>
             <pc:sldMk cId="3166283905" sldId="262"/>
             <ac:spMk id="2" creationId="{157DA00F-5BDE-D260-7533-F94B4664CEA2}"/>
-          </ac:spMkLst>
-        </pc:spChg>
-        <pc:spChg chg="mod">
-          <ac:chgData name="Russell, Brittany" userId="cb15f705-d373-4cb5-ba99-29bd5142b341" providerId="ADAL" clId="{373FFD21-6881-4AE2-914D-683D04AB4F94}" dt="2025-12-08T19:32:33.289" v="4488" actId="20577"/>
-          <ac:spMkLst>
-            <pc:docMk/>
-            <pc:sldMk cId="3166283905" sldId="262"/>
-            <ac:spMk id="4" creationId="{E805A5C5-1B84-AE75-BE9E-001222F38FDE}"/>
           </ac:spMkLst>
         </pc:spChg>
         <pc:graphicFrameChg chg="add mod ord modVis">
@@ -488,14 +257,6 @@
           <pc:sldMk cId="3976213061" sldId="263"/>
         </pc:sldMkLst>
         <pc:spChg chg="mod">
-          <ac:chgData name="Russell, Brittany" userId="cb15f705-d373-4cb5-ba99-29bd5142b341" providerId="ADAL" clId="{373FFD21-6881-4AE2-914D-683D04AB4F94}" dt="2025-12-05T21:05:11.786" v="362" actId="948"/>
-          <ac:spMkLst>
-            <pc:docMk/>
-            <pc:sldMk cId="3976213061" sldId="263"/>
-            <ac:spMk id="2" creationId="{ED8B442A-95A5-38AA-229F-ABC2CB132362}"/>
-          </ac:spMkLst>
-        </pc:spChg>
-        <pc:spChg chg="mod">
           <ac:chgData name="Russell, Brittany" userId="cb15f705-d373-4cb5-ba99-29bd5142b341" providerId="ADAL" clId="{373FFD21-6881-4AE2-914D-683D04AB4F94}" dt="2025-12-29T21:30:38" v="4508" actId="20577"/>
           <ac:spMkLst>
             <pc:docMk/>
@@ -503,14 +264,6 @@
             <ac:spMk id="4" creationId="{2026A791-D8EE-DF21-D275-FD3AF213C5A1}"/>
           </ac:spMkLst>
         </pc:spChg>
-        <pc:graphicFrameChg chg="add mod ord modVis">
-          <ac:chgData name="Russell, Brittany" userId="cb15f705-d373-4cb5-ba99-29bd5142b341" providerId="ADAL" clId="{373FFD21-6881-4AE2-914D-683D04AB4F94}" dt="2025-12-05T21:05:11.830" v="386"/>
-          <ac:graphicFrameMkLst>
-            <pc:docMk/>
-            <pc:sldMk cId="3976213061" sldId="263"/>
-            <ac:graphicFrameMk id="6" creationId="{3E8780B8-ADEA-B6E2-42D3-C58E27B0AD85}"/>
-          </ac:graphicFrameMkLst>
-        </pc:graphicFrameChg>
       </pc:sldChg>
       <pc:sldChg chg="addSp delSp modSp new mod">
         <pc:chgData name="Russell, Brittany" userId="cb15f705-d373-4cb5-ba99-29bd5142b341" providerId="ADAL" clId="{373FFD21-6881-4AE2-914D-683D04AB4F94}" dt="2025-12-29T21:34:05.616" v="4862" actId="20577"/>
@@ -596,54 +349,6 @@
             <ac:spMk id="4" creationId="{59315D38-2130-1A64-2208-4B83A292DCF4}"/>
           </ac:spMkLst>
         </pc:spChg>
-        <pc:spChg chg="add del mod modVis">
-          <ac:chgData name="Russell, Brittany" userId="cb15f705-d373-4cb5-ba99-29bd5142b341" providerId="ADAL" clId="{373FFD21-6881-4AE2-914D-683D04AB4F94}" dt="2025-12-30T21:04:59.080" v="5876"/>
-          <ac:spMkLst>
-            <pc:docMk/>
-            <pc:sldMk cId="3264437972" sldId="266"/>
-            <ac:spMk id="5" creationId="{EEEBD9D7-2139-52C2-9A24-87E5DCB70CEF}"/>
-          </ac:spMkLst>
-        </pc:spChg>
-        <pc:spChg chg="add del mod modVis">
-          <ac:chgData name="Russell, Brittany" userId="cb15f705-d373-4cb5-ba99-29bd5142b341" providerId="ADAL" clId="{373FFD21-6881-4AE2-914D-683D04AB4F94}" dt="2025-12-30T21:05:01.059" v="5918"/>
-          <ac:spMkLst>
-            <pc:docMk/>
-            <pc:sldMk cId="3264437972" sldId="266"/>
-            <ac:spMk id="7" creationId="{041C6BD6-D344-CAB6-7A40-9E2BC87C7140}"/>
-          </ac:spMkLst>
-        </pc:spChg>
-        <pc:spChg chg="add del mod modVis">
-          <ac:chgData name="Russell, Brittany" userId="cb15f705-d373-4cb5-ba99-29bd5142b341" providerId="ADAL" clId="{373FFD21-6881-4AE2-914D-683D04AB4F94}" dt="2025-12-30T21:05:03.113" v="5951"/>
-          <ac:spMkLst>
-            <pc:docMk/>
-            <pc:sldMk cId="3264437972" sldId="266"/>
-            <ac:spMk id="8" creationId="{C007E9B9-774C-BFC0-E9CD-A756B935C2A2}"/>
-          </ac:spMkLst>
-        </pc:spChg>
-        <pc:spChg chg="add del mod modVis">
-          <ac:chgData name="Russell, Brittany" userId="cb15f705-d373-4cb5-ba99-29bd5142b341" providerId="ADAL" clId="{373FFD21-6881-4AE2-914D-683D04AB4F94}" dt="2025-12-30T21:05:04.485" v="5979"/>
-          <ac:spMkLst>
-            <pc:docMk/>
-            <pc:sldMk cId="3264437972" sldId="266"/>
-            <ac:spMk id="9" creationId="{73B6E5C2-116F-0D3A-B5F9-D32484C3A47E}"/>
-          </ac:spMkLst>
-        </pc:spChg>
-        <pc:spChg chg="add del mod modVis">
-          <ac:chgData name="Russell, Brittany" userId="cb15f705-d373-4cb5-ba99-29bd5142b341" providerId="ADAL" clId="{373FFD21-6881-4AE2-914D-683D04AB4F94}" dt="2025-12-30T21:05:07.669" v="6015"/>
-          <ac:spMkLst>
-            <pc:docMk/>
-            <pc:sldMk cId="3264437972" sldId="266"/>
-            <ac:spMk id="10" creationId="{DA0D7F96-50B1-EA7B-0E90-EDFDF8594F3C}"/>
-          </ac:spMkLst>
-        </pc:spChg>
-        <pc:spChg chg="add del mod modVis">
-          <ac:chgData name="Russell, Brittany" userId="cb15f705-d373-4cb5-ba99-29bd5142b341" providerId="ADAL" clId="{373FFD21-6881-4AE2-914D-683D04AB4F94}" dt="2025-12-30T21:05:08.221" v="6041"/>
-          <ac:spMkLst>
-            <pc:docMk/>
-            <pc:sldMk cId="3264437972" sldId="266"/>
-            <ac:spMk id="11" creationId="{29DAB485-CC60-8BD7-ACC2-9FDE0CCA1819}"/>
-          </ac:spMkLst>
-        </pc:spChg>
         <pc:graphicFrameChg chg="add mod ord modVis">
           <ac:chgData name="Russell, Brittany" userId="cb15f705-d373-4cb5-ba99-29bd5142b341" providerId="ADAL" clId="{373FFD21-6881-4AE2-914D-683D04AB4F94}" dt="2025-12-30T21:05:08.223" v="6043"/>
           <ac:graphicFrameMkLst>
@@ -665,14 +370,6 @@
             <pc:docMk/>
             <pc:sldMk cId="3650609025" sldId="267"/>
             <ac:spMk id="2" creationId="{C67021D7-CECF-BE2C-96E5-C4360FD5FF6F}"/>
-          </ac:spMkLst>
-        </pc:spChg>
-        <pc:spChg chg="del">
-          <ac:chgData name="Russell, Brittany" userId="cb15f705-d373-4cb5-ba99-29bd5142b341" providerId="ADAL" clId="{373FFD21-6881-4AE2-914D-683D04AB4F94}" dt="2025-12-30T21:15:06.438" v="7435" actId="478"/>
-          <ac:spMkLst>
-            <pc:docMk/>
-            <pc:sldMk cId="3650609025" sldId="267"/>
-            <ac:spMk id="3" creationId="{FE1F0D0F-6B06-22CD-0699-CAA3DE384C4A}"/>
           </ac:spMkLst>
         </pc:spChg>
         <pc:spChg chg="mod">
@@ -706,14 +403,6 @@
             <ac:spMk id="2" creationId="{173793AB-5ECD-22EC-9840-2622264FCDFA}"/>
           </ac:spMkLst>
         </pc:spChg>
-        <pc:spChg chg="del">
-          <ac:chgData name="Russell, Brittany" userId="cb15f705-d373-4cb5-ba99-29bd5142b341" providerId="ADAL" clId="{373FFD21-6881-4AE2-914D-683D04AB4F94}" dt="2025-12-31T00:49:59.352" v="10216" actId="478"/>
-          <ac:spMkLst>
-            <pc:docMk/>
-            <pc:sldMk cId="2843247039" sldId="268"/>
-            <ac:spMk id="3" creationId="{E7D6018B-917E-526A-EB9E-97083C487F22}"/>
-          </ac:spMkLst>
-        </pc:spChg>
         <pc:spChg chg="mod">
           <ac:chgData name="Russell, Brittany" userId="cb15f705-d373-4cb5-ba99-29bd5142b341" providerId="ADAL" clId="{373FFD21-6881-4AE2-914D-683D04AB4F94}" dt="2025-12-30T21:33:03.027" v="10215" actId="20577"/>
           <ac:spMkLst>
@@ -722,14 +411,6 @@
             <ac:spMk id="4" creationId="{8E87DACC-1BE0-0DD8-34B2-A03A083D0DDC}"/>
           </ac:spMkLst>
         </pc:spChg>
-        <pc:graphicFrameChg chg="add mod ord modVis">
-          <ac:chgData name="Russell, Brittany" userId="cb15f705-d373-4cb5-ba99-29bd5142b341" providerId="ADAL" clId="{373FFD21-6881-4AE2-914D-683D04AB4F94}" dt="2025-12-30T21:15:47.891" v="7463" actId="14100"/>
-          <ac:graphicFrameMkLst>
-            <pc:docMk/>
-            <pc:sldMk cId="2843247039" sldId="268"/>
-            <ac:graphicFrameMk id="5" creationId="{DF1A189B-A7CE-4C32-3F42-138DBC19EB82}"/>
-          </ac:graphicFrameMkLst>
-        </pc:graphicFrameChg>
         <pc:graphicFrameChg chg="add mod ord modVis">
           <ac:chgData name="Russell, Brittany" userId="cb15f705-d373-4cb5-ba99-29bd5142b341" providerId="ADAL" clId="{373FFD21-6881-4AE2-914D-683D04AB4F94}" dt="2025-12-30T21:16:14.567" v="7499"/>
           <ac:graphicFrameMkLst>
@@ -759,222 +440,6 @@
             <pc:docMk/>
             <pc:sldMk cId="1579639687" sldId="269"/>
             <ac:spMk id="4" creationId="{4112C370-8F57-EEFD-46EC-02AD37537DC9}"/>
-          </ac:spMkLst>
-        </pc:spChg>
-        <pc:spChg chg="add del mod modVis">
-          <ac:chgData name="Russell, Brittany" userId="cb15f705-d373-4cb5-ba99-29bd5142b341" providerId="ADAL" clId="{373FFD21-6881-4AE2-914D-683D04AB4F94}" dt="2025-12-30T21:20:08.956" v="7729"/>
-          <ac:spMkLst>
-            <pc:docMk/>
-            <pc:sldMk cId="1579639687" sldId="269"/>
-            <ac:spMk id="5" creationId="{0DDF3439-B05D-3917-79EF-D38A63DE245E}"/>
-          </ac:spMkLst>
-        </pc:spChg>
-        <pc:spChg chg="add del mod modVis">
-          <ac:chgData name="Russell, Brittany" userId="cb15f705-d373-4cb5-ba99-29bd5142b341" providerId="ADAL" clId="{373FFD21-6881-4AE2-914D-683D04AB4F94}" dt="2025-12-30T21:20:12.335" v="7786"/>
-          <ac:spMkLst>
-            <pc:docMk/>
-            <pc:sldMk cId="1579639687" sldId="269"/>
-            <ac:spMk id="7" creationId="{A70B1926-5990-E8A5-C9FC-7AB13DBA506A}"/>
-          </ac:spMkLst>
-        </pc:spChg>
-        <pc:spChg chg="add del mod modVis">
-          <ac:chgData name="Russell, Brittany" userId="cb15f705-d373-4cb5-ba99-29bd5142b341" providerId="ADAL" clId="{373FFD21-6881-4AE2-914D-683D04AB4F94}" dt="2025-12-30T21:20:13.856" v="7813"/>
-          <ac:spMkLst>
-            <pc:docMk/>
-            <pc:sldMk cId="1579639687" sldId="269"/>
-            <ac:spMk id="8" creationId="{FF08EF49-C895-6423-C02E-D6E69F0FF817}"/>
-          </ac:spMkLst>
-        </pc:spChg>
-        <pc:spChg chg="add del mod modVis">
-          <ac:chgData name="Russell, Brittany" userId="cb15f705-d373-4cb5-ba99-29bd5142b341" providerId="ADAL" clId="{373FFD21-6881-4AE2-914D-683D04AB4F94}" dt="2025-12-30T21:20:19.568" v="7841"/>
-          <ac:spMkLst>
-            <pc:docMk/>
-            <pc:sldMk cId="1579639687" sldId="269"/>
-            <ac:spMk id="9" creationId="{192EF348-FA87-B0CF-711D-9C24A8E8A726}"/>
-          </ac:spMkLst>
-        </pc:spChg>
-        <pc:spChg chg="add del mod modVis">
-          <ac:chgData name="Russell, Brittany" userId="cb15f705-d373-4cb5-ba99-29bd5142b341" providerId="ADAL" clId="{373FFD21-6881-4AE2-914D-683D04AB4F94}" dt="2025-12-30T21:20:22.235" v="7877"/>
-          <ac:spMkLst>
-            <pc:docMk/>
-            <pc:sldMk cId="1579639687" sldId="269"/>
-            <ac:spMk id="10" creationId="{9F24738A-9F70-C2C4-1463-281BE10C5E46}"/>
-          </ac:spMkLst>
-        </pc:spChg>
-        <pc:spChg chg="add del mod modVis">
-          <ac:chgData name="Russell, Brittany" userId="cb15f705-d373-4cb5-ba99-29bd5142b341" providerId="ADAL" clId="{373FFD21-6881-4AE2-914D-683D04AB4F94}" dt="2025-12-30T21:20:23.481" v="7908"/>
-          <ac:spMkLst>
-            <pc:docMk/>
-            <pc:sldMk cId="1579639687" sldId="269"/>
-            <ac:spMk id="11" creationId="{DD9F992C-B3C3-8585-2A3C-68C5E29EC1BB}"/>
-          </ac:spMkLst>
-        </pc:spChg>
-        <pc:spChg chg="add del mod modVis">
-          <ac:chgData name="Russell, Brittany" userId="cb15f705-d373-4cb5-ba99-29bd5142b341" providerId="ADAL" clId="{373FFD21-6881-4AE2-914D-683D04AB4F94}" dt="2025-12-30T21:20:25.359" v="7939"/>
-          <ac:spMkLst>
-            <pc:docMk/>
-            <pc:sldMk cId="1579639687" sldId="269"/>
-            <ac:spMk id="12" creationId="{329C4B60-2F32-0A83-D68D-47156712E041}"/>
-          </ac:spMkLst>
-        </pc:spChg>
-        <pc:spChg chg="add del mod modVis">
-          <ac:chgData name="Russell, Brittany" userId="cb15f705-d373-4cb5-ba99-29bd5142b341" providerId="ADAL" clId="{373FFD21-6881-4AE2-914D-683D04AB4F94}" dt="2025-12-30T21:20:28.201" v="7976"/>
-          <ac:spMkLst>
-            <pc:docMk/>
-            <pc:sldMk cId="1579639687" sldId="269"/>
-            <ac:spMk id="13" creationId="{1C123BDE-73E6-C762-F17B-E1FDD5F4DE21}"/>
-          </ac:spMkLst>
-        </pc:spChg>
-        <pc:spChg chg="add del mod modVis">
-          <ac:chgData name="Russell, Brittany" userId="cb15f705-d373-4cb5-ba99-29bd5142b341" providerId="ADAL" clId="{373FFD21-6881-4AE2-914D-683D04AB4F94}" dt="2025-12-30T21:20:29.166" v="8003"/>
-          <ac:spMkLst>
-            <pc:docMk/>
-            <pc:sldMk cId="1579639687" sldId="269"/>
-            <ac:spMk id="14" creationId="{837ADABF-0EE0-887E-5730-656FE139D6EE}"/>
-          </ac:spMkLst>
-        </pc:spChg>
-        <pc:spChg chg="add del mod modVis">
-          <ac:chgData name="Russell, Brittany" userId="cb15f705-d373-4cb5-ba99-29bd5142b341" providerId="ADAL" clId="{373FFD21-6881-4AE2-914D-683D04AB4F94}" dt="2025-12-30T21:20:30.659" v="8033"/>
-          <ac:spMkLst>
-            <pc:docMk/>
-            <pc:sldMk cId="1579639687" sldId="269"/>
-            <ac:spMk id="15" creationId="{A6787B22-D3F8-C4AC-2AA9-EEFEDBCC7E83}"/>
-          </ac:spMkLst>
-        </pc:spChg>
-        <pc:spChg chg="add del mod modVis">
-          <ac:chgData name="Russell, Brittany" userId="cb15f705-d373-4cb5-ba99-29bd5142b341" providerId="ADAL" clId="{373FFD21-6881-4AE2-914D-683D04AB4F94}" dt="2025-12-30T21:20:32.273" v="8065"/>
-          <ac:spMkLst>
-            <pc:docMk/>
-            <pc:sldMk cId="1579639687" sldId="269"/>
-            <ac:spMk id="16" creationId="{AA4EE59F-DC7F-70BD-969A-906545A024A8}"/>
-          </ac:spMkLst>
-        </pc:spChg>
-        <pc:spChg chg="add del mod modVis">
-          <ac:chgData name="Russell, Brittany" userId="cb15f705-d373-4cb5-ba99-29bd5142b341" providerId="ADAL" clId="{373FFD21-6881-4AE2-914D-683D04AB4F94}" dt="2025-12-30T21:20:32.575" v="8092"/>
-          <ac:spMkLst>
-            <pc:docMk/>
-            <pc:sldMk cId="1579639687" sldId="269"/>
-            <ac:spMk id="17" creationId="{351CDB55-D1F9-2C7D-2472-670E051F77A5}"/>
-          </ac:spMkLst>
-        </pc:spChg>
-        <pc:spChg chg="add del mod modVis">
-          <ac:chgData name="Russell, Brittany" userId="cb15f705-d373-4cb5-ba99-29bd5142b341" providerId="ADAL" clId="{373FFD21-6881-4AE2-914D-683D04AB4F94}" dt="2025-12-30T21:20:37.731" v="8148"/>
-          <ac:spMkLst>
-            <pc:docMk/>
-            <pc:sldMk cId="1579639687" sldId="269"/>
-            <ac:spMk id="18" creationId="{561C501B-7381-6B47-85B8-0460F92982DD}"/>
-          </ac:spMkLst>
-        </pc:spChg>
-        <pc:spChg chg="add del mod modVis">
-          <ac:chgData name="Russell, Brittany" userId="cb15f705-d373-4cb5-ba99-29bd5142b341" providerId="ADAL" clId="{373FFD21-6881-4AE2-914D-683D04AB4F94}" dt="2025-12-30T21:20:39.423" v="8178"/>
-          <ac:spMkLst>
-            <pc:docMk/>
-            <pc:sldMk cId="1579639687" sldId="269"/>
-            <ac:spMk id="19" creationId="{A4FD6698-CC29-DFFF-3C3C-766CEDABCABF}"/>
-          </ac:spMkLst>
-        </pc:spChg>
-        <pc:spChg chg="add del mod modVis">
-          <ac:chgData name="Russell, Brittany" userId="cb15f705-d373-4cb5-ba99-29bd5142b341" providerId="ADAL" clId="{373FFD21-6881-4AE2-914D-683D04AB4F94}" dt="2025-12-30T21:20:41.010" v="8206"/>
-          <ac:spMkLst>
-            <pc:docMk/>
-            <pc:sldMk cId="1579639687" sldId="269"/>
-            <ac:spMk id="20" creationId="{D7BE35B9-2D3C-772B-B757-2EAE4C4CC7D0}"/>
-          </ac:spMkLst>
-        </pc:spChg>
-        <pc:spChg chg="add del mod modVis">
-          <ac:chgData name="Russell, Brittany" userId="cb15f705-d373-4cb5-ba99-29bd5142b341" providerId="ADAL" clId="{373FFD21-6881-4AE2-914D-683D04AB4F94}" dt="2025-12-30T21:20:41.663" v="8232"/>
-          <ac:spMkLst>
-            <pc:docMk/>
-            <pc:sldMk cId="1579639687" sldId="269"/>
-            <ac:spMk id="21" creationId="{2A963E81-6A40-AAB0-D4E8-1C8F123C4BFE}"/>
-          </ac:spMkLst>
-        </pc:spChg>
-        <pc:spChg chg="add del mod modVis">
-          <ac:chgData name="Russell, Brittany" userId="cb15f705-d373-4cb5-ba99-29bd5142b341" providerId="ADAL" clId="{373FFD21-6881-4AE2-914D-683D04AB4F94}" dt="2025-12-30T21:20:42.876" v="8258"/>
-          <ac:spMkLst>
-            <pc:docMk/>
-            <pc:sldMk cId="1579639687" sldId="269"/>
-            <ac:spMk id="22" creationId="{8D18ED44-F54D-0CF4-297D-DFA7AA5FF407}"/>
-          </ac:spMkLst>
-        </pc:spChg>
-        <pc:spChg chg="add del mod modVis">
-          <ac:chgData name="Russell, Brittany" userId="cb15f705-d373-4cb5-ba99-29bd5142b341" providerId="ADAL" clId="{373FFD21-6881-4AE2-914D-683D04AB4F94}" dt="2025-12-30T21:20:44.700" v="8287"/>
-          <ac:spMkLst>
-            <pc:docMk/>
-            <pc:sldMk cId="1579639687" sldId="269"/>
-            <ac:spMk id="23" creationId="{F6785486-C2E5-B4AD-0A28-CA2B4EFACDD5}"/>
-          </ac:spMkLst>
-        </pc:spChg>
-        <pc:spChg chg="add del mod modVis">
-          <ac:chgData name="Russell, Brittany" userId="cb15f705-d373-4cb5-ba99-29bd5142b341" providerId="ADAL" clId="{373FFD21-6881-4AE2-914D-683D04AB4F94}" dt="2025-12-30T21:20:46.857" v="8320"/>
-          <ac:spMkLst>
-            <pc:docMk/>
-            <pc:sldMk cId="1579639687" sldId="269"/>
-            <ac:spMk id="24" creationId="{29BFED83-B7D1-E139-AED4-02E938235AB3}"/>
-          </ac:spMkLst>
-        </pc:spChg>
-        <pc:spChg chg="add del mod modVis">
-          <ac:chgData name="Russell, Brittany" userId="cb15f705-d373-4cb5-ba99-29bd5142b341" providerId="ADAL" clId="{373FFD21-6881-4AE2-914D-683D04AB4F94}" dt="2025-12-30T21:20:50.756" v="8359"/>
-          <ac:spMkLst>
-            <pc:docMk/>
-            <pc:sldMk cId="1579639687" sldId="269"/>
-            <ac:spMk id="25" creationId="{8EA35204-2CC2-C2A9-BFAB-E70DA1452D77}"/>
-          </ac:spMkLst>
-        </pc:spChg>
-        <pc:spChg chg="add del mod modVis">
-          <ac:chgData name="Russell, Brittany" userId="cb15f705-d373-4cb5-ba99-29bd5142b341" providerId="ADAL" clId="{373FFD21-6881-4AE2-914D-683D04AB4F94}" dt="2025-12-30T21:20:57.648" v="8386"/>
-          <ac:spMkLst>
-            <pc:docMk/>
-            <pc:sldMk cId="1579639687" sldId="269"/>
-            <ac:spMk id="26" creationId="{74E1ACA5-780E-94AE-2E92-F4C8533507F3}"/>
-          </ac:spMkLst>
-        </pc:spChg>
-        <pc:spChg chg="add del mod modVis">
-          <ac:chgData name="Russell, Brittany" userId="cb15f705-d373-4cb5-ba99-29bd5142b341" providerId="ADAL" clId="{373FFD21-6881-4AE2-914D-683D04AB4F94}" dt="2025-12-30T21:20:59.269" v="8412"/>
-          <ac:spMkLst>
-            <pc:docMk/>
-            <pc:sldMk cId="1579639687" sldId="269"/>
-            <ac:spMk id="27" creationId="{3EC155A6-0990-2B19-0C10-5A17F2B9E819}"/>
-          </ac:spMkLst>
-        </pc:spChg>
-        <pc:spChg chg="add del mod modVis">
-          <ac:chgData name="Russell, Brittany" userId="cb15f705-d373-4cb5-ba99-29bd5142b341" providerId="ADAL" clId="{373FFD21-6881-4AE2-914D-683D04AB4F94}" dt="2025-12-30T21:21:04.169" v="8457"/>
-          <ac:spMkLst>
-            <pc:docMk/>
-            <pc:sldMk cId="1579639687" sldId="269"/>
-            <ac:spMk id="28" creationId="{F7DFDFBC-8834-AFD4-A8C7-7B6E5B6E26C0}"/>
-          </ac:spMkLst>
-        </pc:spChg>
-        <pc:spChg chg="add del mod modVis">
-          <ac:chgData name="Russell, Brittany" userId="cb15f705-d373-4cb5-ba99-29bd5142b341" providerId="ADAL" clId="{373FFD21-6881-4AE2-914D-683D04AB4F94}" dt="2025-12-30T21:21:07.453" v="8484"/>
-          <ac:spMkLst>
-            <pc:docMk/>
-            <pc:sldMk cId="1579639687" sldId="269"/>
-            <ac:spMk id="29" creationId="{C2F7FF54-F07C-E5D6-FD8B-9AD6C460D1CE}"/>
-          </ac:spMkLst>
-        </pc:spChg>
-        <pc:spChg chg="add del mod modVis">
-          <ac:chgData name="Russell, Brittany" userId="cb15f705-d373-4cb5-ba99-29bd5142b341" providerId="ADAL" clId="{373FFD21-6881-4AE2-914D-683D04AB4F94}" dt="2025-12-30T21:21:08.955" v="8510"/>
-          <ac:spMkLst>
-            <pc:docMk/>
-            <pc:sldMk cId="1579639687" sldId="269"/>
-            <ac:spMk id="30" creationId="{62ACAF5D-42F0-EC2D-7157-C498FC0EC02D}"/>
-          </ac:spMkLst>
-        </pc:spChg>
-        <pc:spChg chg="add del mod modVis">
-          <ac:chgData name="Russell, Brittany" userId="cb15f705-d373-4cb5-ba99-29bd5142b341" providerId="ADAL" clId="{373FFD21-6881-4AE2-914D-683D04AB4F94}" dt="2025-12-30T21:21:09.994" v="8539"/>
-          <ac:spMkLst>
-            <pc:docMk/>
-            <pc:sldMk cId="1579639687" sldId="269"/>
-            <ac:spMk id="31" creationId="{4B06814A-1C4B-A30B-C5F4-EDE147188C0A}"/>
-          </ac:spMkLst>
-        </pc:spChg>
-        <pc:spChg chg="add del mod modVis">
-          <ac:chgData name="Russell, Brittany" userId="cb15f705-d373-4cb5-ba99-29bd5142b341" providerId="ADAL" clId="{373FFD21-6881-4AE2-914D-683D04AB4F94}" dt="2025-12-30T21:21:14.348" v="8566"/>
-          <ac:spMkLst>
-            <pc:docMk/>
-            <pc:sldMk cId="1579639687" sldId="269"/>
-            <ac:spMk id="32" creationId="{477972C4-53C4-38C7-6130-F0E68211852A}"/>
           </ac:spMkLst>
         </pc:spChg>
         <pc:graphicFrameChg chg="add mod ord modVis">
@@ -1008,44 +473,263 @@
             <ac:spMk id="4" creationId="{092321D9-DAFC-C49F-5C2D-606A6CAC12AB}"/>
           </ac:spMkLst>
         </pc:spChg>
-        <pc:spChg chg="add del mod modVis">
-          <ac:chgData name="Russell, Brittany" userId="cb15f705-d373-4cb5-ba99-29bd5142b341" providerId="ADAL" clId="{373FFD21-6881-4AE2-914D-683D04AB4F94}" dt="2025-12-30T21:24:05.895" v="9120"/>
-          <ac:spMkLst>
-            <pc:docMk/>
-            <pc:sldMk cId="4030572109" sldId="270"/>
-            <ac:spMk id="6" creationId="{B6327AC9-7336-B772-D429-B9A0D208B89D}"/>
-          </ac:spMkLst>
-        </pc:spChg>
-        <pc:spChg chg="add del mod modVis">
-          <ac:chgData name="Russell, Brittany" userId="cb15f705-d373-4cb5-ba99-29bd5142b341" providerId="ADAL" clId="{373FFD21-6881-4AE2-914D-683D04AB4F94}" dt="2025-12-30T21:24:06.559" v="9146"/>
-          <ac:spMkLst>
-            <pc:docMk/>
-            <pc:sldMk cId="4030572109" sldId="270"/>
-            <ac:spMk id="7" creationId="{AF3DA007-C96A-2AF4-C7F7-2C5F3AA27B26}"/>
-          </ac:spMkLst>
-        </pc:spChg>
-        <pc:spChg chg="add del mod modVis">
-          <ac:chgData name="Russell, Brittany" userId="cb15f705-d373-4cb5-ba99-29bd5142b341" providerId="ADAL" clId="{373FFD21-6881-4AE2-914D-683D04AB4F94}" dt="2025-12-30T21:24:09.954" v="9187"/>
-          <ac:spMkLst>
-            <pc:docMk/>
-            <pc:sldMk cId="4030572109" sldId="270"/>
-            <ac:spMk id="8" creationId="{E688AF95-372F-FFFF-C237-B9EACCDA53DD}"/>
-          </ac:spMkLst>
-        </pc:spChg>
-        <pc:spChg chg="add del mod modVis">
-          <ac:chgData name="Russell, Brittany" userId="cb15f705-d373-4cb5-ba99-29bd5142b341" providerId="ADAL" clId="{373FFD21-6881-4AE2-914D-683D04AB4F94}" dt="2025-12-30T21:24:11.044" v="9217"/>
-          <ac:spMkLst>
-            <pc:docMk/>
-            <pc:sldMk cId="4030572109" sldId="270"/>
-            <ac:spMk id="9" creationId="{54A77218-9400-2ED1-A748-302076762ED8}"/>
-          </ac:spMkLst>
-        </pc:spChg>
         <pc:graphicFrameChg chg="add mod ord modVis">
           <ac:chgData name="Russell, Brittany" userId="cb15f705-d373-4cb5-ba99-29bd5142b341" providerId="ADAL" clId="{373FFD21-6881-4AE2-914D-683D04AB4F94}" dt="2025-12-30T21:24:11.046" v="9219"/>
           <ac:graphicFrameMkLst>
             <pc:docMk/>
             <pc:sldMk cId="4030572109" sldId="270"/>
             <ac:graphicFrameMk id="5" creationId="{BBB272EF-C10D-2454-6C8A-733555234933}"/>
+          </ac:graphicFrameMkLst>
+        </pc:graphicFrameChg>
+      </pc:sldChg>
+      <pc:sldChg chg="modSp mod">
+        <pc:chgData name="Russell, Brittany" userId="cb15f705-d373-4cb5-ba99-29bd5142b341" providerId="ADAL" clId="{373FFD21-6881-4AE2-914D-683D04AB4F94}" dt="2026-01-13T20:55:52.030" v="11672" actId="20577"/>
+        <pc:sldMkLst>
+          <pc:docMk/>
+          <pc:sldMk cId="4124916408" sldId="271"/>
+        </pc:sldMkLst>
+        <pc:spChg chg="mod">
+          <ac:chgData name="Russell, Brittany" userId="cb15f705-d373-4cb5-ba99-29bd5142b341" providerId="ADAL" clId="{373FFD21-6881-4AE2-914D-683D04AB4F94}" dt="2026-01-13T20:55:52.030" v="11672" actId="20577"/>
+          <ac:spMkLst>
+            <pc:docMk/>
+            <pc:sldMk cId="4124916408" sldId="271"/>
+            <ac:spMk id="4" creationId="{3BD5C16C-C817-9FD2-8392-723DF44425DC}"/>
+          </ac:spMkLst>
+        </pc:spChg>
+      </pc:sldChg>
+      <pc:sldChg chg="addSp delSp modSp new mod ord">
+        <pc:chgData name="Russell, Brittany" userId="cb15f705-d373-4cb5-ba99-29bd5142b341" providerId="ADAL" clId="{373FFD21-6881-4AE2-914D-683D04AB4F94}" dt="2026-01-13T20:53:51.025" v="11296"/>
+        <pc:sldMkLst>
+          <pc:docMk/>
+          <pc:sldMk cId="373053207" sldId="272"/>
+        </pc:sldMkLst>
+        <pc:spChg chg="mod">
+          <ac:chgData name="Russell, Brittany" userId="cb15f705-d373-4cb5-ba99-29bd5142b341" providerId="ADAL" clId="{373FFD21-6881-4AE2-914D-683D04AB4F94}" dt="2026-01-13T20:37:18.011" v="10420" actId="948"/>
+          <ac:spMkLst>
+            <pc:docMk/>
+            <pc:sldMk cId="373053207" sldId="272"/>
+            <ac:spMk id="2" creationId="{A0CADDD3-F6D7-73FC-BBF1-B25CB3B54BC5}"/>
+          </ac:spMkLst>
+        </pc:spChg>
+        <pc:spChg chg="del">
+          <ac:chgData name="Russell, Brittany" userId="cb15f705-d373-4cb5-ba99-29bd5142b341" providerId="ADAL" clId="{373FFD21-6881-4AE2-914D-683D04AB4F94}" dt="2026-01-13T20:52:33.187" v="11234" actId="478"/>
+          <ac:spMkLst>
+            <pc:docMk/>
+            <pc:sldMk cId="373053207" sldId="272"/>
+            <ac:spMk id="3" creationId="{0D2C347D-A786-3C83-5E27-BF384B38D433}"/>
+          </ac:spMkLst>
+        </pc:spChg>
+        <pc:spChg chg="mod">
+          <ac:chgData name="Russell, Brittany" userId="cb15f705-d373-4cb5-ba99-29bd5142b341" providerId="ADAL" clId="{373FFD21-6881-4AE2-914D-683D04AB4F94}" dt="2026-01-13T20:53:43.627" v="11294" actId="20577"/>
+          <ac:spMkLst>
+            <pc:docMk/>
+            <pc:sldMk cId="373053207" sldId="272"/>
+            <ac:spMk id="4" creationId="{9408940A-270F-42BB-23FF-4F62615C02DA}"/>
+          </ac:spMkLst>
+        </pc:spChg>
+        <pc:spChg chg="add del mod modVis">
+          <ac:chgData name="Russell, Brittany" userId="cb15f705-d373-4cb5-ba99-29bd5142b341" providerId="ADAL" clId="{373FFD21-6881-4AE2-914D-683D04AB4F94}" dt="2026-01-13T20:36:50.504" v="10252"/>
+          <ac:spMkLst>
+            <pc:docMk/>
+            <pc:sldMk cId="373053207" sldId="272"/>
+            <ac:spMk id="5" creationId="{3F3A813B-6DB1-A1D2-20C7-B7D2BC5E74E7}"/>
+          </ac:spMkLst>
+        </pc:spChg>
+        <pc:spChg chg="add del mod modVis">
+          <ac:chgData name="Russell, Brittany" userId="cb15f705-d373-4cb5-ba99-29bd5142b341" providerId="ADAL" clId="{373FFD21-6881-4AE2-914D-683D04AB4F94}" dt="2026-01-13T20:37:02.741" v="10342"/>
+          <ac:spMkLst>
+            <pc:docMk/>
+            <pc:sldMk cId="373053207" sldId="272"/>
+            <ac:spMk id="7" creationId="{D523B9E3-8830-C208-46E1-A01864BF5DD2}"/>
+          </ac:spMkLst>
+        </pc:spChg>
+        <pc:spChg chg="add del mod modVis">
+          <ac:chgData name="Russell, Brittany" userId="cb15f705-d373-4cb5-ba99-29bd5142b341" providerId="ADAL" clId="{373FFD21-6881-4AE2-914D-683D04AB4F94}" dt="2026-01-13T20:37:14.383" v="10405"/>
+          <ac:spMkLst>
+            <pc:docMk/>
+            <pc:sldMk cId="373053207" sldId="272"/>
+            <ac:spMk id="8" creationId="{A49580CA-9798-FF3A-2881-5B09C2BF94FC}"/>
+          </ac:spMkLst>
+        </pc:spChg>
+        <pc:spChg chg="add del mod modVis">
+          <ac:chgData name="Russell, Brittany" userId="cb15f705-d373-4cb5-ba99-29bd5142b341" providerId="ADAL" clId="{373FFD21-6881-4AE2-914D-683D04AB4F94}" dt="2026-01-13T20:37:18.096" v="10442"/>
+          <ac:spMkLst>
+            <pc:docMk/>
+            <pc:sldMk cId="373053207" sldId="272"/>
+            <ac:spMk id="9" creationId="{A38CB2BB-C926-B363-6B91-9A9BBEC8D8E9}"/>
+          </ac:spMkLst>
+        </pc:spChg>
+        <pc:graphicFrameChg chg="add mod ord modVis">
+          <ac:chgData name="Russell, Brittany" userId="cb15f705-d373-4cb5-ba99-29bd5142b341" providerId="ADAL" clId="{373FFD21-6881-4AE2-914D-683D04AB4F94}" dt="2026-01-13T20:37:18.100" v="10444"/>
+          <ac:graphicFrameMkLst>
+            <pc:docMk/>
+            <pc:sldMk cId="373053207" sldId="272"/>
+            <ac:graphicFrameMk id="6" creationId="{AA995927-8D42-979A-3478-872592D3C458}"/>
+          </ac:graphicFrameMkLst>
+        </pc:graphicFrameChg>
+      </pc:sldChg>
+      <pc:sldChg chg="addSp delSp modSp new mod modClrScheme chgLayout">
+        <pc:chgData name="Russell, Brittany" userId="cb15f705-d373-4cb5-ba99-29bd5142b341" providerId="ADAL" clId="{373FFD21-6881-4AE2-914D-683D04AB4F94}" dt="2026-01-13T20:54:50.141" v="11391"/>
+        <pc:sldMkLst>
+          <pc:docMk/>
+          <pc:sldMk cId="1061824857" sldId="273"/>
+        </pc:sldMkLst>
+        <pc:spChg chg="del mod ord">
+          <ac:chgData name="Russell, Brittany" userId="cb15f705-d373-4cb5-ba99-29bd5142b341" providerId="ADAL" clId="{373FFD21-6881-4AE2-914D-683D04AB4F94}" dt="2026-01-13T20:54:32.775" v="11298" actId="700"/>
+          <ac:spMkLst>
+            <pc:docMk/>
+            <pc:sldMk cId="1061824857" sldId="273"/>
+            <ac:spMk id="2" creationId="{E201C2A6-CB82-F321-4A15-1B77D8796CEC}"/>
+          </ac:spMkLst>
+        </pc:spChg>
+        <pc:spChg chg="del">
+          <ac:chgData name="Russell, Brittany" userId="cb15f705-d373-4cb5-ba99-29bd5142b341" providerId="ADAL" clId="{373FFD21-6881-4AE2-914D-683D04AB4F94}" dt="2026-01-13T20:54:32.775" v="11298" actId="700"/>
+          <ac:spMkLst>
+            <pc:docMk/>
+            <pc:sldMk cId="1061824857" sldId="273"/>
+            <ac:spMk id="3" creationId="{35015434-19E6-E786-E4F5-77B838DDD61D}"/>
+          </ac:spMkLst>
+        </pc:spChg>
+        <pc:spChg chg="del">
+          <ac:chgData name="Russell, Brittany" userId="cb15f705-d373-4cb5-ba99-29bd5142b341" providerId="ADAL" clId="{373FFD21-6881-4AE2-914D-683D04AB4F94}" dt="2026-01-13T20:54:32.775" v="11298" actId="700"/>
+          <ac:spMkLst>
+            <pc:docMk/>
+            <pc:sldMk cId="1061824857" sldId="273"/>
+            <ac:spMk id="4" creationId="{0F4966D7-5FE7-89DC-E2EF-43F6231F492A}"/>
+          </ac:spMkLst>
+        </pc:spChg>
+        <pc:spChg chg="add mod ord">
+          <ac:chgData name="Russell, Brittany" userId="cb15f705-d373-4cb5-ba99-29bd5142b341" providerId="ADAL" clId="{373FFD21-6881-4AE2-914D-683D04AB4F94}" dt="2026-01-13T20:54:50.095" v="11367" actId="948"/>
+          <ac:spMkLst>
+            <pc:docMk/>
+            <pc:sldMk cId="1061824857" sldId="273"/>
+            <ac:spMk id="5" creationId="{E396F8EE-04B1-6216-58E0-E3A626A00F9D}"/>
+          </ac:spMkLst>
+        </pc:spChg>
+        <pc:spChg chg="add del mod modVis">
+          <ac:chgData name="Russell, Brittany" userId="cb15f705-d373-4cb5-ba99-29bd5142b341" providerId="ADAL" clId="{373FFD21-6881-4AE2-914D-683D04AB4F94}" dt="2026-01-13T20:54:49.227" v="11362"/>
+          <ac:spMkLst>
+            <pc:docMk/>
+            <pc:sldMk cId="1061824857" sldId="273"/>
+            <ac:spMk id="7" creationId="{0A685442-D582-1639-6DE0-2EF958993F13}"/>
+          </ac:spMkLst>
+        </pc:spChg>
+        <pc:spChg chg="add del mod modVis">
+          <ac:chgData name="Russell, Brittany" userId="cb15f705-d373-4cb5-ba99-29bd5142b341" providerId="ADAL" clId="{373FFD21-6881-4AE2-914D-683D04AB4F94}" dt="2026-01-13T20:54:50.139" v="11389"/>
+          <ac:spMkLst>
+            <pc:docMk/>
+            <pc:sldMk cId="1061824857" sldId="273"/>
+            <ac:spMk id="8" creationId="{1CCF2A54-7C8A-4841-34FE-A76EDA25D37F}"/>
+          </ac:spMkLst>
+        </pc:spChg>
+        <pc:graphicFrameChg chg="add mod ord modVis">
+          <ac:chgData name="Russell, Brittany" userId="cb15f705-d373-4cb5-ba99-29bd5142b341" providerId="ADAL" clId="{373FFD21-6881-4AE2-914D-683D04AB4F94}" dt="2026-01-13T20:54:50.141" v="11391"/>
+          <ac:graphicFrameMkLst>
+            <pc:docMk/>
+            <pc:sldMk cId="1061824857" sldId="273"/>
+            <ac:graphicFrameMk id="6" creationId="{CE5D21D7-D443-22E6-B538-703F4F3A7F57}"/>
+          </ac:graphicFrameMkLst>
+        </pc:graphicFrameChg>
+      </pc:sldChg>
+      <pc:sldChg chg="addSp delSp modSp new mod">
+        <pc:chgData name="Russell, Brittany" userId="cb15f705-d373-4cb5-ba99-29bd5142b341" providerId="ADAL" clId="{373FFD21-6881-4AE2-914D-683D04AB4F94}" dt="2026-01-13T20:55:11.031" v="11494"/>
+        <pc:sldMkLst>
+          <pc:docMk/>
+          <pc:sldMk cId="17619433" sldId="274"/>
+        </pc:sldMkLst>
+        <pc:spChg chg="mod">
+          <ac:chgData name="Russell, Brittany" userId="cb15f705-d373-4cb5-ba99-29bd5142b341" providerId="ADAL" clId="{373FFD21-6881-4AE2-914D-683D04AB4F94}" dt="2026-01-13T20:55:10.985" v="11470" actId="948"/>
+          <ac:spMkLst>
+            <pc:docMk/>
+            <pc:sldMk cId="17619433" sldId="274"/>
+            <ac:spMk id="2" creationId="{EE648E82-01AB-F265-7BCC-EA47E7C9F188}"/>
+          </ac:spMkLst>
+        </pc:spChg>
+        <pc:spChg chg="add del mod modVis">
+          <ac:chgData name="Russell, Brittany" userId="cb15f705-d373-4cb5-ba99-29bd5142b341" providerId="ADAL" clId="{373FFD21-6881-4AE2-914D-683D04AB4F94}" dt="2026-01-13T20:55:04.304" v="11422"/>
+          <ac:spMkLst>
+            <pc:docMk/>
+            <pc:sldMk cId="17619433" sldId="274"/>
+            <ac:spMk id="3" creationId="{6679CCD8-A17A-24A7-6EE7-4592CDDF332E}"/>
+          </ac:spMkLst>
+        </pc:spChg>
+        <pc:spChg chg="add del mod modVis">
+          <ac:chgData name="Russell, Brittany" userId="cb15f705-d373-4cb5-ba99-29bd5142b341" providerId="ADAL" clId="{373FFD21-6881-4AE2-914D-683D04AB4F94}" dt="2026-01-13T20:55:11.029" v="11492"/>
+          <ac:spMkLst>
+            <pc:docMk/>
+            <pc:sldMk cId="17619433" sldId="274"/>
+            <ac:spMk id="5" creationId="{682C45F4-4BAE-9DD7-96EC-6CBCF269C8EA}"/>
+          </ac:spMkLst>
+        </pc:spChg>
+        <pc:graphicFrameChg chg="add mod ord modVis">
+          <ac:chgData name="Russell, Brittany" userId="cb15f705-d373-4cb5-ba99-29bd5142b341" providerId="ADAL" clId="{373FFD21-6881-4AE2-914D-683D04AB4F94}" dt="2026-01-13T20:55:11.031" v="11494"/>
+          <ac:graphicFrameMkLst>
+            <pc:docMk/>
+            <pc:sldMk cId="17619433" sldId="274"/>
+            <ac:graphicFrameMk id="4" creationId="{F4A3E4E2-8A46-B2E4-C420-8EAD90EA0B79}"/>
+          </ac:graphicFrameMkLst>
+        </pc:graphicFrameChg>
+      </pc:sldChg>
+      <pc:sldChg chg="addSp delSp modSp new mod">
+        <pc:chgData name="Russell, Brittany" userId="cb15f705-d373-4cb5-ba99-29bd5142b341" providerId="ADAL" clId="{373FFD21-6881-4AE2-914D-683D04AB4F94}" dt="2026-01-13T20:55:33.968" v="11653"/>
+        <pc:sldMkLst>
+          <pc:docMk/>
+          <pc:sldMk cId="2062482305" sldId="275"/>
+        </pc:sldMkLst>
+        <pc:spChg chg="mod">
+          <ac:chgData name="Russell, Brittany" userId="cb15f705-d373-4cb5-ba99-29bd5142b341" providerId="ADAL" clId="{373FFD21-6881-4AE2-914D-683D04AB4F94}" dt="2026-01-13T20:55:33.938" v="11629" actId="948"/>
+          <ac:spMkLst>
+            <pc:docMk/>
+            <pc:sldMk cId="2062482305" sldId="275"/>
+            <ac:spMk id="2" creationId="{AAC3051D-39B0-4A93-FDF8-5E026A06F0B4}"/>
+          </ac:spMkLst>
+        </pc:spChg>
+        <pc:spChg chg="add del mod modVis">
+          <ac:chgData name="Russell, Brittany" userId="cb15f705-d373-4cb5-ba99-29bd5142b341" providerId="ADAL" clId="{373FFD21-6881-4AE2-914D-683D04AB4F94}" dt="2026-01-13T20:55:29.439" v="11526"/>
+          <ac:spMkLst>
+            <pc:docMk/>
+            <pc:sldMk cId="2062482305" sldId="275"/>
+            <ac:spMk id="3" creationId="{0A8ECDDB-1942-FE3B-BF18-3777910139A9}"/>
+          </ac:spMkLst>
+        </pc:spChg>
+        <pc:spChg chg="add del mod modVis">
+          <ac:chgData name="Russell, Brittany" userId="cb15f705-d373-4cb5-ba99-29bd5142b341" providerId="ADAL" clId="{373FFD21-6881-4AE2-914D-683D04AB4F94}" dt="2026-01-13T20:55:30.045" v="11564"/>
+          <ac:spMkLst>
+            <pc:docMk/>
+            <pc:sldMk cId="2062482305" sldId="275"/>
+            <ac:spMk id="5" creationId="{1C3325C9-312E-89C7-D42B-1624E5737BF8}"/>
+          </ac:spMkLst>
+        </pc:spChg>
+        <pc:spChg chg="add del mod modVis">
+          <ac:chgData name="Russell, Brittany" userId="cb15f705-d373-4cb5-ba99-29bd5142b341" providerId="ADAL" clId="{373FFD21-6881-4AE2-914D-683D04AB4F94}" dt="2026-01-13T20:55:30.636" v="11590"/>
+          <ac:spMkLst>
+            <pc:docMk/>
+            <pc:sldMk cId="2062482305" sldId="275"/>
+            <ac:spMk id="6" creationId="{CD4AB149-E9A6-F53C-D789-1A582CCCD277}"/>
+          </ac:spMkLst>
+        </pc:spChg>
+        <pc:spChg chg="add del mod modVis">
+          <ac:chgData name="Russell, Brittany" userId="cb15f705-d373-4cb5-ba99-29bd5142b341" providerId="ADAL" clId="{373FFD21-6881-4AE2-914D-683D04AB4F94}" dt="2026-01-13T20:55:32.851" v="11621"/>
+          <ac:spMkLst>
+            <pc:docMk/>
+            <pc:sldMk cId="2062482305" sldId="275"/>
+            <ac:spMk id="7" creationId="{0497DA2A-AB5D-5072-C1D3-17C439ACA4F2}"/>
+          </ac:spMkLst>
+        </pc:spChg>
+        <pc:spChg chg="add del mod modVis">
+          <ac:chgData name="Russell, Brittany" userId="cb15f705-d373-4cb5-ba99-29bd5142b341" providerId="ADAL" clId="{373FFD21-6881-4AE2-914D-683D04AB4F94}" dt="2026-01-13T20:55:33.967" v="11651"/>
+          <ac:spMkLst>
+            <pc:docMk/>
+            <pc:sldMk cId="2062482305" sldId="275"/>
+            <ac:spMk id="8" creationId="{B88E2871-4333-01E6-496A-C558AF0A0FAD}"/>
+          </ac:spMkLst>
+        </pc:spChg>
+        <pc:graphicFrameChg chg="add mod ord modVis">
+          <ac:chgData name="Russell, Brittany" userId="cb15f705-d373-4cb5-ba99-29bd5142b341" providerId="ADAL" clId="{373FFD21-6881-4AE2-914D-683D04AB4F94}" dt="2026-01-13T20:55:33.968" v="11653"/>
+          <ac:graphicFrameMkLst>
+            <pc:docMk/>
+            <pc:sldMk cId="2062482305" sldId="275"/>
+            <ac:graphicFrameMk id="4" creationId="{C3AD0F1B-29CB-AA0C-291B-0AFA17A0FA3E}"/>
           </ac:graphicFrameMkLst>
         </pc:graphicFrameChg>
       </pc:sldChg>
@@ -39116,6 +38800,349 @@
       </p:grpSpPr>
       <p:graphicFrame>
         <p:nvGraphicFramePr>
+          <p:cNvPr id="4" name="think-cell data - do not delete" hidden="1">
+            <a:extLst>
+              <a:ext uri="{FF2B5EF4-FFF2-40B4-BE49-F238E27FC236}">
+                <a16:creationId xmlns:a16="http://schemas.microsoft.com/office/drawing/2014/main" id="{F4A3E4E2-8A46-B2E4-C420-8EAD90EA0B79}"/>
+              </a:ext>
+            </a:extLst>
+          </p:cNvPr>
+          <p:cNvGraphicFramePr>
+            <a:graphicFrameLocks noChangeAspect="1"/>
+          </p:cNvGraphicFramePr>
+          <p:nvPr>
+            <p:custDataLst>
+              <p:tags r:id="rId1"/>
+            </p:custDataLst>
+            <p:extLst>
+              <p:ext uri="{D42A27DB-BD31-4B8C-83A1-F6EECF244321}">
+                <p14:modId xmlns:p14="http://schemas.microsoft.com/office/powerpoint/2010/main" val="2792214002"/>
+              </p:ext>
+            </p:extLst>
+          </p:nvPr>
+        </p:nvGraphicFramePr>
+        <p:xfrm>
+          <a:off x="1588" y="1588"/>
+          <a:ext cx="1588" cy="1588"/>
+        </p:xfrm>
+        <a:graphic>
+          <a:graphicData uri="http://schemas.openxmlformats.org/presentationml/2006/ole">
+            <mc:AlternateContent xmlns:mc="http://schemas.openxmlformats.org/markup-compatibility/2006">
+              <mc:Choice xmlns:v="urn:schemas-microsoft-com:vml" Requires="v">
+                <p:oleObj name="think-cell Slide" r:id="rId3" imgW="425" imgH="424" progId="TCLayout.ActiveDocument.1">
+                  <p:embed/>
+                </p:oleObj>
+              </mc:Choice>
+              <mc:Fallback>
+                <p:oleObj name="think-cell Slide" r:id="rId3" imgW="425" imgH="424" progId="TCLayout.ActiveDocument.1">
+                  <p:embed/>
+                  <p:pic>
+                    <p:nvPicPr>
+                      <p:cNvPr id="4" name="think-cell data - do not delete" hidden="1">
+                        <a:extLst>
+                          <a:ext uri="{FF2B5EF4-FFF2-40B4-BE49-F238E27FC236}">
+                            <a16:creationId xmlns:a16="http://schemas.microsoft.com/office/drawing/2014/main" id="{F4A3E4E2-8A46-B2E4-C420-8EAD90EA0B79}"/>
+                          </a:ext>
+                        </a:extLst>
+                      </p:cNvPr>
+                      <p:cNvPicPr/>
+                      <p:nvPr/>
+                    </p:nvPicPr>
+                    <p:blipFill>
+                      <a:blip r:embed="rId4"/>
+                      <a:stretch>
+                        <a:fillRect/>
+                      </a:stretch>
+                    </p:blipFill>
+                    <p:spPr>
+                      <a:xfrm>
+                        <a:off x="1588" y="1588"/>
+                        <a:ext cx="1588" cy="1588"/>
+                      </a:xfrm>
+                      <a:prstGeom prst="rect">
+                        <a:avLst/>
+                      </a:prstGeom>
+                    </p:spPr>
+                  </p:pic>
+                </p:oleObj>
+              </mc:Fallback>
+            </mc:AlternateContent>
+          </a:graphicData>
+        </a:graphic>
+      </p:graphicFrame>
+      <p:sp>
+        <p:nvSpPr>
+          <p:cNvPr id="2" name="Title 1">
+            <a:extLst>
+              <a:ext uri="{FF2B5EF4-FFF2-40B4-BE49-F238E27FC236}">
+                <a16:creationId xmlns:a16="http://schemas.microsoft.com/office/drawing/2014/main" id="{EE648E82-01AB-F265-7BCC-EA47E7C9F188}"/>
+              </a:ext>
+            </a:extLst>
+          </p:cNvPr>
+          <p:cNvSpPr>
+            <a:spLocks noGrp="1"/>
+          </p:cNvSpPr>
+          <p:nvPr>
+            <p:ph type="ctrTitle"/>
+          </p:nvPr>
+        </p:nvSpPr>
+        <p:spPr/>
+        <p:txBody>
+          <a:bodyPr vert="horz"/>
+          <a:lstStyle/>
+          <a:p>
+            <a:r>
+              <a:rPr lang="en-US" dirty="0"/>
+              <a:t>What is the Grammar of Graphics?</a:t>
+            </a:r>
+          </a:p>
+        </p:txBody>
+      </p:sp>
+    </p:spTree>
+    <p:extLst>
+      <p:ext uri="{BB962C8B-B14F-4D97-AF65-F5344CB8AC3E}">
+        <p14:creationId xmlns:p14="http://schemas.microsoft.com/office/powerpoint/2010/main" val="17619433"/>
+      </p:ext>
+    </p:extLst>
+  </p:cSld>
+  <p:clrMapOvr>
+    <a:masterClrMapping/>
+  </p:clrMapOvr>
+</p:sld>
+</file>
+
+<file path=ppt/slides/slide11.xml><?xml version="1.0" encoding="utf-8"?>
+<p:sld xmlns:a="http://schemas.openxmlformats.org/drawingml/2006/main" xmlns:r="http://schemas.openxmlformats.org/officeDocument/2006/relationships" xmlns:p="http://schemas.openxmlformats.org/presentationml/2006/main">
+  <p:cSld>
+    <p:spTree>
+      <p:nvGrpSpPr>
+        <p:cNvPr id="1" name=""/>
+        <p:cNvGrpSpPr/>
+        <p:nvPr/>
+      </p:nvGrpSpPr>
+      <p:grpSpPr>
+        <a:xfrm>
+          <a:off x="0" y="0"/>
+          <a:ext cx="0" cy="0"/>
+          <a:chOff x="0" y="0"/>
+          <a:chExt cx="0" cy="0"/>
+        </a:xfrm>
+      </p:grpSpPr>
+      <p:graphicFrame>
+        <p:nvGraphicFramePr>
+          <p:cNvPr id="5" name="think-cell data - do not delete" hidden="1">
+            <a:extLst>
+              <a:ext uri="{FF2B5EF4-FFF2-40B4-BE49-F238E27FC236}">
+                <a16:creationId xmlns:a16="http://schemas.microsoft.com/office/drawing/2014/main" id="{FF1A53B0-8C07-7522-7B94-41E5B75181A3}"/>
+              </a:ext>
+            </a:extLst>
+          </p:cNvPr>
+          <p:cNvGraphicFramePr>
+            <a:graphicFrameLocks noChangeAspect="1"/>
+          </p:cNvGraphicFramePr>
+          <p:nvPr>
+            <p:custDataLst>
+              <p:tags r:id="rId1"/>
+            </p:custDataLst>
+            <p:extLst>
+              <p:ext uri="{D42A27DB-BD31-4B8C-83A1-F6EECF244321}">
+                <p14:modId xmlns:p14="http://schemas.microsoft.com/office/powerpoint/2010/main" val="1040671606"/>
+              </p:ext>
+            </p:extLst>
+          </p:nvPr>
+        </p:nvGraphicFramePr>
+        <p:xfrm>
+          <a:off x="1588" y="1588"/>
+          <a:ext cx="1588" cy="1588"/>
+        </p:xfrm>
+        <a:graphic>
+          <a:graphicData uri="http://schemas.openxmlformats.org/presentationml/2006/ole">
+            <mc:AlternateContent xmlns:mc="http://schemas.openxmlformats.org/markup-compatibility/2006">
+              <mc:Choice xmlns:v="urn:schemas-microsoft-com:vml" Requires="v">
+                <p:oleObj name="think-cell Slide" r:id="rId3" imgW="425" imgH="424" progId="TCLayout.ActiveDocument.1">
+                  <p:embed/>
+                </p:oleObj>
+              </mc:Choice>
+              <mc:Fallback>
+                <p:oleObj name="think-cell Slide" r:id="rId3" imgW="425" imgH="424" progId="TCLayout.ActiveDocument.1">
+                  <p:embed/>
+                  <p:pic>
+                    <p:nvPicPr>
+                      <p:cNvPr id="5" name="think-cell data - do not delete" hidden="1">
+                        <a:extLst>
+                          <a:ext uri="{FF2B5EF4-FFF2-40B4-BE49-F238E27FC236}">
+                            <a16:creationId xmlns:a16="http://schemas.microsoft.com/office/drawing/2014/main" id="{FF1A53B0-8C07-7522-7B94-41E5B75181A3}"/>
+                          </a:ext>
+                        </a:extLst>
+                      </p:cNvPr>
+                      <p:cNvPicPr/>
+                      <p:nvPr/>
+                    </p:nvPicPr>
+                    <p:blipFill>
+                      <a:blip r:embed="rId4"/>
+                      <a:stretch>
+                        <a:fillRect/>
+                      </a:stretch>
+                    </p:blipFill>
+                    <p:spPr>
+                      <a:xfrm>
+                        <a:off x="1588" y="1588"/>
+                        <a:ext cx="1588" cy="1588"/>
+                      </a:xfrm>
+                      <a:prstGeom prst="rect">
+                        <a:avLst/>
+                      </a:prstGeom>
+                    </p:spPr>
+                  </p:pic>
+                </p:oleObj>
+              </mc:Fallback>
+            </mc:AlternateContent>
+          </a:graphicData>
+        </a:graphic>
+      </p:graphicFrame>
+      <p:sp>
+        <p:nvSpPr>
+          <p:cNvPr id="2" name="Title 1">
+            <a:extLst>
+              <a:ext uri="{FF2B5EF4-FFF2-40B4-BE49-F238E27FC236}">
+                <a16:creationId xmlns:a16="http://schemas.microsoft.com/office/drawing/2014/main" id="{E679ED84-CD8B-DF99-4E75-C50CAEFA30CE}"/>
+              </a:ext>
+            </a:extLst>
+          </p:cNvPr>
+          <p:cNvSpPr>
+            <a:spLocks noGrp="1"/>
+          </p:cNvSpPr>
+          <p:nvPr>
+            <p:ph type="title"/>
+          </p:nvPr>
+        </p:nvSpPr>
+        <p:spPr/>
+        <p:txBody>
+          <a:bodyPr vert="horz">
+            <a:normAutofit/>
+          </a:bodyPr>
+          <a:lstStyle/>
+          <a:p>
+            <a:r>
+              <a:rPr lang="en-US" dirty="0"/>
+              <a:t>The Grammar of Graphics</a:t>
+            </a:r>
+          </a:p>
+        </p:txBody>
+      </p:sp>
+      <p:sp>
+        <p:nvSpPr>
+          <p:cNvPr id="3" name="Content Placeholder 2">
+            <a:extLst>
+              <a:ext uri="{FF2B5EF4-FFF2-40B4-BE49-F238E27FC236}">
+                <a16:creationId xmlns:a16="http://schemas.microsoft.com/office/drawing/2014/main" id="{8F82501C-2933-500C-C49C-5EDF48807E88}"/>
+              </a:ext>
+            </a:extLst>
+          </p:cNvPr>
+          <p:cNvSpPr>
+            <a:spLocks noGrp="1"/>
+          </p:cNvSpPr>
+          <p:nvPr>
+            <p:ph idx="20"/>
+          </p:nvPr>
+        </p:nvSpPr>
+        <p:spPr/>
+        <p:txBody>
+          <a:bodyPr/>
+          <a:lstStyle/>
+          <a:p>
+            <a:endParaRPr lang="en-US"/>
+          </a:p>
+        </p:txBody>
+      </p:sp>
+      <p:sp>
+        <p:nvSpPr>
+          <p:cNvPr id="4" name="Content Placeholder 3">
+            <a:extLst>
+              <a:ext uri="{FF2B5EF4-FFF2-40B4-BE49-F238E27FC236}">
+                <a16:creationId xmlns:a16="http://schemas.microsoft.com/office/drawing/2014/main" id="{797664FC-C7C9-2420-70C7-E30A75F42DEE}"/>
+              </a:ext>
+            </a:extLst>
+          </p:cNvPr>
+          <p:cNvSpPr>
+            <a:spLocks noGrp="1"/>
+          </p:cNvSpPr>
+          <p:nvPr>
+            <p:ph idx="1"/>
+          </p:nvPr>
+        </p:nvSpPr>
+        <p:spPr/>
+        <p:txBody>
+          <a:bodyPr/>
+          <a:lstStyle/>
+          <a:p>
+            <a:r>
+              <a:rPr lang="en-US" dirty="0">
+                <a:hlinkClick r:id="rId5"/>
+              </a:rPr>
+              <a:t>The Grammar of Graphics, Second Edition (Statistics and Computing)</a:t>
+            </a:r>
+            <a:endParaRPr lang="en-US" dirty="0"/>
+          </a:p>
+          <a:p>
+            <a:pPr lvl="1"/>
+            <a:r>
+              <a:rPr lang="en-US" dirty="0"/>
+              <a:t>Book by Leland Wilkinson, published in 2005, the inspiration for </a:t>
+            </a:r>
+            <a:r>
+              <a:rPr lang="en-US" dirty="0" err="1"/>
+              <a:t>ggplot’s</a:t>
+            </a:r>
+            <a:r>
+              <a:rPr lang="en-US" dirty="0"/>
+              <a:t> structure</a:t>
+            </a:r>
+          </a:p>
+          <a:p>
+            <a:pPr lvl="1"/>
+            <a:endParaRPr lang="en-US" dirty="0"/>
+          </a:p>
+          <a:p>
+            <a:r>
+              <a:rPr lang="en-US" dirty="0"/>
+              <a:t>“Grammar makes language expressive. A language consisting of words and no grammar (statement = word) expresses only as many ideas as there are words. By specifying how words are combined in statements, a grammar expands a language’s scope. This book is about grammatical rules for creating perceivable graphs, or what we call graphics. The grammar of graphics takes us beyond a limited set of charts (words) to an almost unlimited world of graphical forms (statement).”</a:t>
+            </a:r>
+          </a:p>
+        </p:txBody>
+      </p:sp>
+    </p:spTree>
+    <p:extLst>
+      <p:ext uri="{BB962C8B-B14F-4D97-AF65-F5344CB8AC3E}">
+        <p14:creationId xmlns:p14="http://schemas.microsoft.com/office/powerpoint/2010/main" val="1897466452"/>
+      </p:ext>
+    </p:extLst>
+  </p:cSld>
+  <p:clrMapOvr>
+    <a:masterClrMapping/>
+  </p:clrMapOvr>
+</p:sld>
+</file>
+
+<file path=ppt/slides/slide12.xml><?xml version="1.0" encoding="utf-8"?>
+<p:sld xmlns:a="http://schemas.openxmlformats.org/drawingml/2006/main" xmlns:r="http://schemas.openxmlformats.org/officeDocument/2006/relationships" xmlns:p="http://schemas.openxmlformats.org/presentationml/2006/main">
+  <p:cSld>
+    <p:spTree>
+      <p:nvGrpSpPr>
+        <p:cNvPr id="1" name=""/>
+        <p:cNvGrpSpPr/>
+        <p:nvPr/>
+      </p:nvGrpSpPr>
+      <p:grpSpPr>
+        <a:xfrm>
+          <a:off x="0" y="0"/>
+          <a:ext cx="0" cy="0"/>
+          <a:chOff x="0" y="0"/>
+          <a:chExt cx="0" cy="0"/>
+        </a:xfrm>
+      </p:grpSpPr>
+      <p:graphicFrame>
+        <p:nvGraphicFramePr>
           <p:cNvPr id="6" name="think-cell data - do not delete" hidden="1">
             <a:extLst>
               <a:ext uri="{FF2B5EF4-FFF2-40B4-BE49-F238E27FC236}">
@@ -40214,7 +40241,7 @@
 </p:sld>
 </file>
 
-<file path=ppt/slides/slide11.xml><?xml version="1.0" encoding="utf-8"?>
+<file path=ppt/slides/slide13.xml><?xml version="1.0" encoding="utf-8"?>
 <p:sld xmlns:a="http://schemas.openxmlformats.org/drawingml/2006/main" xmlns:r="http://schemas.openxmlformats.org/officeDocument/2006/relationships" xmlns:p="http://schemas.openxmlformats.org/presentationml/2006/main">
   <p:cSld>
     <p:spTree>
@@ -40567,7 +40594,7 @@
 </p:sld>
 </file>
 
-<file path=ppt/slides/slide12.xml><?xml version="1.0" encoding="utf-8"?>
+<file path=ppt/slides/slide14.xml><?xml version="1.0" encoding="utf-8"?>
 <p:sld xmlns:a="http://schemas.openxmlformats.org/drawingml/2006/main" xmlns:r="http://schemas.openxmlformats.org/officeDocument/2006/relationships" xmlns:p="http://schemas.openxmlformats.org/presentationml/2006/main">
   <p:cSld>
     <p:spTree>
@@ -40914,7 +40941,357 @@
 </p:sld>
 </file>
 
-<file path=ppt/slides/slide13.xml><?xml version="1.0" encoding="utf-8"?>
+<file path=ppt/slides/slide15.xml><?xml version="1.0" encoding="utf-8"?>
+<p:sld xmlns:a="http://schemas.openxmlformats.org/drawingml/2006/main" xmlns:r="http://schemas.openxmlformats.org/officeDocument/2006/relationships" xmlns:p="http://schemas.openxmlformats.org/presentationml/2006/main">
+  <p:cSld>
+    <p:spTree>
+      <p:nvGrpSpPr>
+        <p:cNvPr id="1" name=""/>
+        <p:cNvGrpSpPr/>
+        <p:nvPr/>
+      </p:nvGrpSpPr>
+      <p:grpSpPr>
+        <a:xfrm>
+          <a:off x="0" y="0"/>
+          <a:ext cx="0" cy="0"/>
+          <a:chOff x="0" y="0"/>
+          <a:chExt cx="0" cy="0"/>
+        </a:xfrm>
+      </p:grpSpPr>
+      <p:graphicFrame>
+        <p:nvGraphicFramePr>
+          <p:cNvPr id="4" name="think-cell data - do not delete" hidden="1">
+            <a:extLst>
+              <a:ext uri="{FF2B5EF4-FFF2-40B4-BE49-F238E27FC236}">
+                <a16:creationId xmlns:a16="http://schemas.microsoft.com/office/drawing/2014/main" id="{C3AD0F1B-29CB-AA0C-291B-0AFA17A0FA3E}"/>
+              </a:ext>
+            </a:extLst>
+          </p:cNvPr>
+          <p:cNvGraphicFramePr>
+            <a:graphicFrameLocks noChangeAspect="1"/>
+          </p:cNvGraphicFramePr>
+          <p:nvPr>
+            <p:custDataLst>
+              <p:tags r:id="rId1"/>
+            </p:custDataLst>
+            <p:extLst>
+              <p:ext uri="{D42A27DB-BD31-4B8C-83A1-F6EECF244321}">
+                <p14:modId xmlns:p14="http://schemas.microsoft.com/office/powerpoint/2010/main" val="961292684"/>
+              </p:ext>
+            </p:extLst>
+          </p:nvPr>
+        </p:nvGraphicFramePr>
+        <p:xfrm>
+          <a:off x="1588" y="1588"/>
+          <a:ext cx="1588" cy="1588"/>
+        </p:xfrm>
+        <a:graphic>
+          <a:graphicData uri="http://schemas.openxmlformats.org/presentationml/2006/ole">
+            <mc:AlternateContent xmlns:mc="http://schemas.openxmlformats.org/markup-compatibility/2006">
+              <mc:Choice xmlns:v="urn:schemas-microsoft-com:vml" Requires="v">
+                <p:oleObj name="think-cell Slide" r:id="rId3" imgW="425" imgH="424" progId="TCLayout.ActiveDocument.1">
+                  <p:embed/>
+                </p:oleObj>
+              </mc:Choice>
+              <mc:Fallback>
+                <p:oleObj name="think-cell Slide" r:id="rId3" imgW="425" imgH="424" progId="TCLayout.ActiveDocument.1">
+                  <p:embed/>
+                  <p:pic>
+                    <p:nvPicPr>
+                      <p:cNvPr id="4" name="think-cell data - do not delete" hidden="1">
+                        <a:extLst>
+                          <a:ext uri="{FF2B5EF4-FFF2-40B4-BE49-F238E27FC236}">
+                            <a16:creationId xmlns:a16="http://schemas.microsoft.com/office/drawing/2014/main" id="{C3AD0F1B-29CB-AA0C-291B-0AFA17A0FA3E}"/>
+                          </a:ext>
+                        </a:extLst>
+                      </p:cNvPr>
+                      <p:cNvPicPr/>
+                      <p:nvPr/>
+                    </p:nvPicPr>
+                    <p:blipFill>
+                      <a:blip r:embed="rId4"/>
+                      <a:stretch>
+                        <a:fillRect/>
+                      </a:stretch>
+                    </p:blipFill>
+                    <p:spPr>
+                      <a:xfrm>
+                        <a:off x="1588" y="1588"/>
+                        <a:ext cx="1588" cy="1588"/>
+                      </a:xfrm>
+                      <a:prstGeom prst="rect">
+                        <a:avLst/>
+                      </a:prstGeom>
+                    </p:spPr>
+                  </p:pic>
+                </p:oleObj>
+              </mc:Fallback>
+            </mc:AlternateContent>
+          </a:graphicData>
+        </a:graphic>
+      </p:graphicFrame>
+      <p:sp>
+        <p:nvSpPr>
+          <p:cNvPr id="2" name="Title 1">
+            <a:extLst>
+              <a:ext uri="{FF2B5EF4-FFF2-40B4-BE49-F238E27FC236}">
+                <a16:creationId xmlns:a16="http://schemas.microsoft.com/office/drawing/2014/main" id="{AAC3051D-39B0-4A93-FDF8-5E026A06F0B4}"/>
+              </a:ext>
+            </a:extLst>
+          </p:cNvPr>
+          <p:cNvSpPr>
+            <a:spLocks noGrp="1"/>
+          </p:cNvSpPr>
+          <p:nvPr>
+            <p:ph type="ctrTitle"/>
+          </p:nvPr>
+        </p:nvSpPr>
+        <p:spPr/>
+        <p:txBody>
+          <a:bodyPr vert="horz"/>
+          <a:lstStyle/>
+          <a:p>
+            <a:r>
+              <a:rPr lang="en-US" dirty="0"/>
+              <a:t>Time to Get Started</a:t>
+            </a:r>
+          </a:p>
+        </p:txBody>
+      </p:sp>
+    </p:spTree>
+    <p:extLst>
+      <p:ext uri="{BB962C8B-B14F-4D97-AF65-F5344CB8AC3E}">
+        <p14:creationId xmlns:p14="http://schemas.microsoft.com/office/powerpoint/2010/main" val="2062482305"/>
+      </p:ext>
+    </p:extLst>
+  </p:cSld>
+  <p:clrMapOvr>
+    <a:masterClrMapping/>
+  </p:clrMapOvr>
+</p:sld>
+</file>
+
+<file path=ppt/slides/slide16.xml><?xml version="1.0" encoding="utf-8"?>
+<p:sld xmlns:a="http://schemas.openxmlformats.org/drawingml/2006/main" xmlns:r="http://schemas.openxmlformats.org/officeDocument/2006/relationships" xmlns:p="http://schemas.openxmlformats.org/presentationml/2006/main">
+  <p:cSld>
+    <p:spTree>
+      <p:nvGrpSpPr>
+        <p:cNvPr id="1" name=""/>
+        <p:cNvGrpSpPr/>
+        <p:nvPr/>
+      </p:nvGrpSpPr>
+      <p:grpSpPr>
+        <a:xfrm>
+          <a:off x="0" y="0"/>
+          <a:ext cx="0" cy="0"/>
+          <a:chOff x="0" y="0"/>
+          <a:chExt cx="0" cy="0"/>
+        </a:xfrm>
+      </p:grpSpPr>
+      <p:graphicFrame>
+        <p:nvGraphicFramePr>
+          <p:cNvPr id="6" name="think-cell data - do not delete" hidden="1">
+            <a:extLst>
+              <a:ext uri="{FF2B5EF4-FFF2-40B4-BE49-F238E27FC236}">
+                <a16:creationId xmlns:a16="http://schemas.microsoft.com/office/drawing/2014/main" id="{AA995927-8D42-979A-3478-872592D3C458}"/>
+              </a:ext>
+            </a:extLst>
+          </p:cNvPr>
+          <p:cNvGraphicFramePr>
+            <a:graphicFrameLocks noChangeAspect="1"/>
+          </p:cNvGraphicFramePr>
+          <p:nvPr>
+            <p:custDataLst>
+              <p:tags r:id="rId1"/>
+            </p:custDataLst>
+            <p:extLst>
+              <p:ext uri="{D42A27DB-BD31-4B8C-83A1-F6EECF244321}">
+                <p14:modId xmlns:p14="http://schemas.microsoft.com/office/powerpoint/2010/main" val="1507861702"/>
+              </p:ext>
+            </p:extLst>
+          </p:nvPr>
+        </p:nvGraphicFramePr>
+        <p:xfrm>
+          <a:off x="1588" y="1588"/>
+          <a:ext cx="1588" cy="1588"/>
+        </p:xfrm>
+        <a:graphic>
+          <a:graphicData uri="http://schemas.openxmlformats.org/presentationml/2006/ole">
+            <mc:AlternateContent xmlns:mc="http://schemas.openxmlformats.org/markup-compatibility/2006">
+              <mc:Choice xmlns:v="urn:schemas-microsoft-com:vml" Requires="v">
+                <p:oleObj name="think-cell Slide" r:id="rId3" imgW="425" imgH="424" progId="TCLayout.ActiveDocument.1">
+                  <p:embed/>
+                </p:oleObj>
+              </mc:Choice>
+              <mc:Fallback>
+                <p:oleObj name="think-cell Slide" r:id="rId3" imgW="425" imgH="424" progId="TCLayout.ActiveDocument.1">
+                  <p:embed/>
+                  <p:pic>
+                    <p:nvPicPr>
+                      <p:cNvPr id="6" name="think-cell data - do not delete" hidden="1">
+                        <a:extLst>
+                          <a:ext uri="{FF2B5EF4-FFF2-40B4-BE49-F238E27FC236}">
+                            <a16:creationId xmlns:a16="http://schemas.microsoft.com/office/drawing/2014/main" id="{AA995927-8D42-979A-3478-872592D3C458}"/>
+                          </a:ext>
+                        </a:extLst>
+                      </p:cNvPr>
+                      <p:cNvPicPr/>
+                      <p:nvPr/>
+                    </p:nvPicPr>
+                    <p:blipFill>
+                      <a:blip r:embed="rId4"/>
+                      <a:stretch>
+                        <a:fillRect/>
+                      </a:stretch>
+                    </p:blipFill>
+                    <p:spPr>
+                      <a:xfrm>
+                        <a:off x="1588" y="1588"/>
+                        <a:ext cx="1588" cy="1588"/>
+                      </a:xfrm>
+                      <a:prstGeom prst="rect">
+                        <a:avLst/>
+                      </a:prstGeom>
+                    </p:spPr>
+                  </p:pic>
+                </p:oleObj>
+              </mc:Fallback>
+            </mc:AlternateContent>
+          </a:graphicData>
+        </a:graphic>
+      </p:graphicFrame>
+      <p:sp>
+        <p:nvSpPr>
+          <p:cNvPr id="2" name="Title 1">
+            <a:extLst>
+              <a:ext uri="{FF2B5EF4-FFF2-40B4-BE49-F238E27FC236}">
+                <a16:creationId xmlns:a16="http://schemas.microsoft.com/office/drawing/2014/main" id="{A0CADDD3-F6D7-73FC-BBF1-B25CB3B54BC5}"/>
+              </a:ext>
+            </a:extLst>
+          </p:cNvPr>
+          <p:cNvSpPr>
+            <a:spLocks noGrp="1"/>
+          </p:cNvSpPr>
+          <p:nvPr>
+            <p:ph type="title"/>
+          </p:nvPr>
+        </p:nvSpPr>
+        <p:spPr/>
+        <p:txBody>
+          <a:bodyPr vert="horz"/>
+          <a:lstStyle/>
+          <a:p>
+            <a:r>
+              <a:rPr lang="en-US" dirty="0"/>
+              <a:t>Instructions for Code Files</a:t>
+            </a:r>
+          </a:p>
+        </p:txBody>
+      </p:sp>
+      <p:sp>
+        <p:nvSpPr>
+          <p:cNvPr id="4" name="Content Placeholder 3">
+            <a:extLst>
+              <a:ext uri="{FF2B5EF4-FFF2-40B4-BE49-F238E27FC236}">
+                <a16:creationId xmlns:a16="http://schemas.microsoft.com/office/drawing/2014/main" id="{9408940A-270F-42BB-23FF-4F62615C02DA}"/>
+              </a:ext>
+            </a:extLst>
+          </p:cNvPr>
+          <p:cNvSpPr>
+            <a:spLocks noGrp="1"/>
+          </p:cNvSpPr>
+          <p:nvPr>
+            <p:ph idx="1"/>
+          </p:nvPr>
+        </p:nvSpPr>
+        <p:spPr/>
+        <p:txBody>
+          <a:bodyPr/>
+          <a:lstStyle/>
+          <a:p>
+            <a:r>
+              <a:rPr lang="en-US" dirty="0"/>
+              <a:t>I have created “Student Copy” code files which include libraries, data, and other setup and the outline of code we will complete together</a:t>
+            </a:r>
+          </a:p>
+          <a:p>
+            <a:endParaRPr lang="en-US" dirty="0"/>
+          </a:p>
+          <a:p>
+            <a:r>
+              <a:rPr lang="en-US" dirty="0"/>
+              <a:t>Download the Student Copy code files from the </a:t>
+            </a:r>
+            <a:r>
+              <a:rPr lang="en-US" dirty="0" err="1"/>
+              <a:t>github</a:t>
+            </a:r>
+            <a:r>
+              <a:rPr lang="en-US" dirty="0"/>
+              <a:t> repo: </a:t>
+            </a:r>
+            <a:r>
+              <a:rPr lang="en-US" dirty="0">
+                <a:hlinkClick r:id="rId5"/>
+              </a:rPr>
+              <a:t>brussell23/</a:t>
+            </a:r>
+            <a:r>
+              <a:rPr lang="en-US" dirty="0" err="1">
+                <a:hlinkClick r:id="rId5"/>
+              </a:rPr>
+              <a:t>grammar_of_graphics</a:t>
+            </a:r>
+            <a:r>
+              <a:rPr lang="en-US" dirty="0">
+                <a:hlinkClick r:id="rId5"/>
+              </a:rPr>
+              <a:t>: Data sets and other materials for OAAR Analytics Grammar of Graphics PD training</a:t>
+            </a:r>
+            <a:endParaRPr lang="en-US" dirty="0"/>
+          </a:p>
+          <a:p>
+            <a:endParaRPr lang="en-US" dirty="0"/>
+          </a:p>
+          <a:p>
+            <a:r>
+              <a:rPr lang="en-US" dirty="0"/>
+              <a:t>Save copies of the files with your own name to keep track of them (ex: “Grammar of Graphics Notebook </a:t>
+            </a:r>
+            <a:r>
+              <a:rPr lang="en-US" dirty="0" err="1"/>
+              <a:t>Brittany.ipynb</a:t>
+            </a:r>
+            <a:r>
+              <a:rPr lang="en-US" dirty="0"/>
+              <a:t>”)</a:t>
+            </a:r>
+          </a:p>
+          <a:p>
+            <a:endParaRPr lang="en-US" dirty="0"/>
+          </a:p>
+          <a:p>
+            <a:r>
+              <a:rPr lang="en-US" dirty="0"/>
+              <a:t>In Posit Cloud, create a copy of the student code file with your name and save it in the cloud project </a:t>
+            </a:r>
+          </a:p>
+        </p:txBody>
+      </p:sp>
+    </p:spTree>
+    <p:extLst>
+      <p:ext uri="{BB962C8B-B14F-4D97-AF65-F5344CB8AC3E}">
+        <p14:creationId xmlns:p14="http://schemas.microsoft.com/office/powerpoint/2010/main" val="373053207"/>
+      </p:ext>
+    </p:extLst>
+  </p:cSld>
+  <p:clrMapOvr>
+    <a:masterClrMapping/>
+  </p:clrMapOvr>
+</p:sld>
+</file>
+
+<file path=ppt/slides/slide17.xml><?xml version="1.0" encoding="utf-8"?>
 <p:sld xmlns:a="http://schemas.openxmlformats.org/drawingml/2006/main" xmlns:r="http://schemas.openxmlformats.org/officeDocument/2006/relationships" xmlns:p="http://schemas.openxmlformats.org/presentationml/2006/main">
   <p:cSld>
     <p:spTree>
@@ -41132,7 +41509,7 @@
 </p:sld>
 </file>
 
-<file path=ppt/slides/slide14.xml><?xml version="1.0" encoding="utf-8"?>
+<file path=ppt/slides/slide18.xml><?xml version="1.0" encoding="utf-8"?>
 <p:sld xmlns:a="http://schemas.openxmlformats.org/drawingml/2006/main" xmlns:r="http://schemas.openxmlformats.org/officeDocument/2006/relationships" xmlns:p="http://schemas.openxmlformats.org/presentationml/2006/main">
   <p:cSld>
     <p:spTree>
@@ -41189,7 +41566,13 @@
                   <p:embed/>
                   <p:pic>
                     <p:nvPicPr>
-                      <p:cNvPr id="0" name=""/>
+                      <p:cNvPr id="5" name="think-cell data - do not delete" hidden="1">
+                        <a:extLst>
+                          <a:ext uri="{FF2B5EF4-FFF2-40B4-BE49-F238E27FC236}">
+                            <a16:creationId xmlns:a16="http://schemas.microsoft.com/office/drawing/2014/main" id="{C2F88915-A173-0ACC-0FB5-D3C826AB3C4A}"/>
+                          </a:ext>
+                        </a:extLst>
+                      </p:cNvPr>
                       <p:cNvPicPr/>
                       <p:nvPr/>
                     </p:nvPicPr>
@@ -41274,7 +41657,7 @@
             </a:r>
             <a:r>
               <a:rPr lang="en-US" dirty="0"/>
-              <a:t> to share in the next PD session (02/04)</a:t>
+              <a:t> to share in our next session (02/04)</a:t>
             </a:r>
           </a:p>
           <a:p>
@@ -42440,6 +42823,136 @@
           <p:cNvPr id="6" name="think-cell data - do not delete" hidden="1">
             <a:extLst>
               <a:ext uri="{FF2B5EF4-FFF2-40B4-BE49-F238E27FC236}">
+                <a16:creationId xmlns:a16="http://schemas.microsoft.com/office/drawing/2014/main" id="{CE5D21D7-D443-22E6-B538-703F4F3A7F57}"/>
+              </a:ext>
+            </a:extLst>
+          </p:cNvPr>
+          <p:cNvGraphicFramePr>
+            <a:graphicFrameLocks noChangeAspect="1"/>
+          </p:cNvGraphicFramePr>
+          <p:nvPr>
+            <p:custDataLst>
+              <p:tags r:id="rId1"/>
+            </p:custDataLst>
+            <p:extLst>
+              <p:ext uri="{D42A27DB-BD31-4B8C-83A1-F6EECF244321}">
+                <p14:modId xmlns:p14="http://schemas.microsoft.com/office/powerpoint/2010/main" val="445707953"/>
+              </p:ext>
+            </p:extLst>
+          </p:nvPr>
+        </p:nvGraphicFramePr>
+        <p:xfrm>
+          <a:off x="1588" y="1588"/>
+          <a:ext cx="1588" cy="1588"/>
+        </p:xfrm>
+        <a:graphic>
+          <a:graphicData uri="http://schemas.openxmlformats.org/presentationml/2006/ole">
+            <mc:AlternateContent xmlns:mc="http://schemas.openxmlformats.org/markup-compatibility/2006">
+              <mc:Choice xmlns:v="urn:schemas-microsoft-com:vml" Requires="v">
+                <p:oleObj name="think-cell Slide" r:id="rId3" imgW="425" imgH="424" progId="TCLayout.ActiveDocument.1">
+                  <p:embed/>
+                </p:oleObj>
+              </mc:Choice>
+              <mc:Fallback>
+                <p:oleObj name="think-cell Slide" r:id="rId3" imgW="425" imgH="424" progId="TCLayout.ActiveDocument.1">
+                  <p:embed/>
+                  <p:pic>
+                    <p:nvPicPr>
+                      <p:cNvPr id="6" name="think-cell data - do not delete" hidden="1">
+                        <a:extLst>
+                          <a:ext uri="{FF2B5EF4-FFF2-40B4-BE49-F238E27FC236}">
+                            <a16:creationId xmlns:a16="http://schemas.microsoft.com/office/drawing/2014/main" id="{CE5D21D7-D443-22E6-B538-703F4F3A7F57}"/>
+                          </a:ext>
+                        </a:extLst>
+                      </p:cNvPr>
+                      <p:cNvPicPr/>
+                      <p:nvPr/>
+                    </p:nvPicPr>
+                    <p:blipFill>
+                      <a:blip r:embed="rId4"/>
+                      <a:stretch>
+                        <a:fillRect/>
+                      </a:stretch>
+                    </p:blipFill>
+                    <p:spPr>
+                      <a:xfrm>
+                        <a:off x="1588" y="1588"/>
+                        <a:ext cx="1588" cy="1588"/>
+                      </a:xfrm>
+                      <a:prstGeom prst="rect">
+                        <a:avLst/>
+                      </a:prstGeom>
+                    </p:spPr>
+                  </p:pic>
+                </p:oleObj>
+              </mc:Fallback>
+            </mc:AlternateContent>
+          </a:graphicData>
+        </a:graphic>
+      </p:graphicFrame>
+      <p:sp>
+        <p:nvSpPr>
+          <p:cNvPr id="5" name="Title 4">
+            <a:extLst>
+              <a:ext uri="{FF2B5EF4-FFF2-40B4-BE49-F238E27FC236}">
+                <a16:creationId xmlns:a16="http://schemas.microsoft.com/office/drawing/2014/main" id="{E396F8EE-04B1-6216-58E0-E3A626A00F9D}"/>
+              </a:ext>
+            </a:extLst>
+          </p:cNvPr>
+          <p:cNvSpPr>
+            <a:spLocks noGrp="1"/>
+          </p:cNvSpPr>
+          <p:nvPr>
+            <p:ph type="ctrTitle"/>
+          </p:nvPr>
+        </p:nvSpPr>
+        <p:spPr/>
+        <p:txBody>
+          <a:bodyPr vert="horz"/>
+          <a:lstStyle/>
+          <a:p>
+            <a:r>
+              <a:rPr lang="en-US" dirty="0"/>
+              <a:t>Getting Set Up</a:t>
+            </a:r>
+          </a:p>
+        </p:txBody>
+      </p:sp>
+    </p:spTree>
+    <p:extLst>
+      <p:ext uri="{BB962C8B-B14F-4D97-AF65-F5344CB8AC3E}">
+        <p14:creationId xmlns:p14="http://schemas.microsoft.com/office/powerpoint/2010/main" val="1061824857"/>
+      </p:ext>
+    </p:extLst>
+  </p:cSld>
+  <p:clrMapOvr>
+    <a:masterClrMapping/>
+  </p:clrMapOvr>
+</p:sld>
+</file>
+
+<file path=ppt/slides/slide8.xml><?xml version="1.0" encoding="utf-8"?>
+<p:sld xmlns:a="http://schemas.openxmlformats.org/drawingml/2006/main" xmlns:r="http://schemas.openxmlformats.org/officeDocument/2006/relationships" xmlns:p="http://schemas.openxmlformats.org/presentationml/2006/main">
+  <p:cSld>
+    <p:spTree>
+      <p:nvGrpSpPr>
+        <p:cNvPr id="1" name=""/>
+        <p:cNvGrpSpPr/>
+        <p:nvPr/>
+      </p:nvGrpSpPr>
+      <p:grpSpPr>
+        <a:xfrm>
+          <a:off x="0" y="0"/>
+          <a:ext cx="0" cy="0"/>
+          <a:chOff x="0" y="0"/>
+          <a:chExt cx="0" cy="0"/>
+        </a:xfrm>
+      </p:grpSpPr>
+      <p:graphicFrame>
+        <p:nvGraphicFramePr>
+          <p:cNvPr id="6" name="think-cell data - do not delete" hidden="1">
+            <a:extLst>
+              <a:ext uri="{FF2B5EF4-FFF2-40B4-BE49-F238E27FC236}">
                 <a16:creationId xmlns:a16="http://schemas.microsoft.com/office/drawing/2014/main" id="{6F9877D2-B99D-E626-527A-37D4B1F25690}"/>
               </a:ext>
             </a:extLst>
@@ -42695,7 +43208,7 @@
 </p:sld>
 </file>
 
-<file path=ppt/slides/slide8.xml><?xml version="1.0" encoding="utf-8"?>
+<file path=ppt/slides/slide9.xml><?xml version="1.0" encoding="utf-8"?>
 <p:sld xmlns:a="http://schemas.openxmlformats.org/drawingml/2006/main" xmlns:r="http://schemas.openxmlformats.org/officeDocument/2006/relationships" xmlns:p="http://schemas.openxmlformats.org/presentationml/2006/main">
   <p:cSld>
     <p:spTree>
@@ -43126,219 +43639,6 @@
     <p:extLst>
       <p:ext uri="{BB962C8B-B14F-4D97-AF65-F5344CB8AC3E}">
         <p14:creationId xmlns:p14="http://schemas.microsoft.com/office/powerpoint/2010/main" val="3976213061"/>
-      </p:ext>
-    </p:extLst>
-  </p:cSld>
-  <p:clrMapOvr>
-    <a:masterClrMapping/>
-  </p:clrMapOvr>
-</p:sld>
-</file>
-
-<file path=ppt/slides/slide9.xml><?xml version="1.0" encoding="utf-8"?>
-<p:sld xmlns:a="http://schemas.openxmlformats.org/drawingml/2006/main" xmlns:r="http://schemas.openxmlformats.org/officeDocument/2006/relationships" xmlns:p="http://schemas.openxmlformats.org/presentationml/2006/main">
-  <p:cSld>
-    <p:spTree>
-      <p:nvGrpSpPr>
-        <p:cNvPr id="1" name=""/>
-        <p:cNvGrpSpPr/>
-        <p:nvPr/>
-      </p:nvGrpSpPr>
-      <p:grpSpPr>
-        <a:xfrm>
-          <a:off x="0" y="0"/>
-          <a:ext cx="0" cy="0"/>
-          <a:chOff x="0" y="0"/>
-          <a:chExt cx="0" cy="0"/>
-        </a:xfrm>
-      </p:grpSpPr>
-      <p:graphicFrame>
-        <p:nvGraphicFramePr>
-          <p:cNvPr id="5" name="think-cell data - do not delete" hidden="1">
-            <a:extLst>
-              <a:ext uri="{FF2B5EF4-FFF2-40B4-BE49-F238E27FC236}">
-                <a16:creationId xmlns:a16="http://schemas.microsoft.com/office/drawing/2014/main" id="{FF1A53B0-8C07-7522-7B94-41E5B75181A3}"/>
-              </a:ext>
-            </a:extLst>
-          </p:cNvPr>
-          <p:cNvGraphicFramePr>
-            <a:graphicFrameLocks noChangeAspect="1"/>
-          </p:cNvGraphicFramePr>
-          <p:nvPr>
-            <p:custDataLst>
-              <p:tags r:id="rId1"/>
-            </p:custDataLst>
-            <p:extLst>
-              <p:ext uri="{D42A27DB-BD31-4B8C-83A1-F6EECF244321}">
-                <p14:modId xmlns:p14="http://schemas.microsoft.com/office/powerpoint/2010/main" val="1040671606"/>
-              </p:ext>
-            </p:extLst>
-          </p:nvPr>
-        </p:nvGraphicFramePr>
-        <p:xfrm>
-          <a:off x="1588" y="1588"/>
-          <a:ext cx="1588" cy="1588"/>
-        </p:xfrm>
-        <a:graphic>
-          <a:graphicData uri="http://schemas.openxmlformats.org/presentationml/2006/ole">
-            <mc:AlternateContent xmlns:mc="http://schemas.openxmlformats.org/markup-compatibility/2006">
-              <mc:Choice xmlns:v="urn:schemas-microsoft-com:vml" Requires="v">
-                <p:oleObj name="think-cell Slide" r:id="rId3" imgW="425" imgH="424" progId="TCLayout.ActiveDocument.1">
-                  <p:embed/>
-                </p:oleObj>
-              </mc:Choice>
-              <mc:Fallback>
-                <p:oleObj name="think-cell Slide" r:id="rId3" imgW="425" imgH="424" progId="TCLayout.ActiveDocument.1">
-                  <p:embed/>
-                  <p:pic>
-                    <p:nvPicPr>
-                      <p:cNvPr id="5" name="think-cell data - do not delete" hidden="1">
-                        <a:extLst>
-                          <a:ext uri="{FF2B5EF4-FFF2-40B4-BE49-F238E27FC236}">
-                            <a16:creationId xmlns:a16="http://schemas.microsoft.com/office/drawing/2014/main" id="{FF1A53B0-8C07-7522-7B94-41E5B75181A3}"/>
-                          </a:ext>
-                        </a:extLst>
-                      </p:cNvPr>
-                      <p:cNvPicPr/>
-                      <p:nvPr/>
-                    </p:nvPicPr>
-                    <p:blipFill>
-                      <a:blip r:embed="rId4"/>
-                      <a:stretch>
-                        <a:fillRect/>
-                      </a:stretch>
-                    </p:blipFill>
-                    <p:spPr>
-                      <a:xfrm>
-                        <a:off x="1588" y="1588"/>
-                        <a:ext cx="1588" cy="1588"/>
-                      </a:xfrm>
-                      <a:prstGeom prst="rect">
-                        <a:avLst/>
-                      </a:prstGeom>
-                    </p:spPr>
-                  </p:pic>
-                </p:oleObj>
-              </mc:Fallback>
-            </mc:AlternateContent>
-          </a:graphicData>
-        </a:graphic>
-      </p:graphicFrame>
-      <p:sp>
-        <p:nvSpPr>
-          <p:cNvPr id="2" name="Title 1">
-            <a:extLst>
-              <a:ext uri="{FF2B5EF4-FFF2-40B4-BE49-F238E27FC236}">
-                <a16:creationId xmlns:a16="http://schemas.microsoft.com/office/drawing/2014/main" id="{E679ED84-CD8B-DF99-4E75-C50CAEFA30CE}"/>
-              </a:ext>
-            </a:extLst>
-          </p:cNvPr>
-          <p:cNvSpPr>
-            <a:spLocks noGrp="1"/>
-          </p:cNvSpPr>
-          <p:nvPr>
-            <p:ph type="title"/>
-          </p:nvPr>
-        </p:nvSpPr>
-        <p:spPr/>
-        <p:txBody>
-          <a:bodyPr vert="horz">
-            <a:normAutofit/>
-          </a:bodyPr>
-          <a:lstStyle/>
-          <a:p>
-            <a:r>
-              <a:rPr lang="en-US" dirty="0"/>
-              <a:t>The Grammar of Graphics</a:t>
-            </a:r>
-          </a:p>
-        </p:txBody>
-      </p:sp>
-      <p:sp>
-        <p:nvSpPr>
-          <p:cNvPr id="3" name="Content Placeholder 2">
-            <a:extLst>
-              <a:ext uri="{FF2B5EF4-FFF2-40B4-BE49-F238E27FC236}">
-                <a16:creationId xmlns:a16="http://schemas.microsoft.com/office/drawing/2014/main" id="{8F82501C-2933-500C-C49C-5EDF48807E88}"/>
-              </a:ext>
-            </a:extLst>
-          </p:cNvPr>
-          <p:cNvSpPr>
-            <a:spLocks noGrp="1"/>
-          </p:cNvSpPr>
-          <p:nvPr>
-            <p:ph idx="20"/>
-          </p:nvPr>
-        </p:nvSpPr>
-        <p:spPr/>
-        <p:txBody>
-          <a:bodyPr/>
-          <a:lstStyle/>
-          <a:p>
-            <a:endParaRPr lang="en-US"/>
-          </a:p>
-        </p:txBody>
-      </p:sp>
-      <p:sp>
-        <p:nvSpPr>
-          <p:cNvPr id="4" name="Content Placeholder 3">
-            <a:extLst>
-              <a:ext uri="{FF2B5EF4-FFF2-40B4-BE49-F238E27FC236}">
-                <a16:creationId xmlns:a16="http://schemas.microsoft.com/office/drawing/2014/main" id="{797664FC-C7C9-2420-70C7-E30A75F42DEE}"/>
-              </a:ext>
-            </a:extLst>
-          </p:cNvPr>
-          <p:cNvSpPr>
-            <a:spLocks noGrp="1"/>
-          </p:cNvSpPr>
-          <p:nvPr>
-            <p:ph idx="1"/>
-          </p:nvPr>
-        </p:nvSpPr>
-        <p:spPr/>
-        <p:txBody>
-          <a:bodyPr/>
-          <a:lstStyle/>
-          <a:p>
-            <a:r>
-              <a:rPr lang="en-US" dirty="0">
-                <a:hlinkClick r:id="rId5"/>
-              </a:rPr>
-              <a:t>The Grammar of Graphics, Second Edition (Statistics and Computing)</a:t>
-            </a:r>
-            <a:endParaRPr lang="en-US" dirty="0"/>
-          </a:p>
-          <a:p>
-            <a:pPr lvl="1"/>
-            <a:r>
-              <a:rPr lang="en-US" dirty="0"/>
-              <a:t>Book by Leland Wilkinson, published in 2005, the inspiration for </a:t>
-            </a:r>
-            <a:r>
-              <a:rPr lang="en-US" dirty="0" err="1"/>
-              <a:t>ggplot’s</a:t>
-            </a:r>
-            <a:r>
-              <a:rPr lang="en-US" dirty="0"/>
-              <a:t> structure</a:t>
-            </a:r>
-          </a:p>
-          <a:p>
-            <a:pPr lvl="1"/>
-            <a:endParaRPr lang="en-US" dirty="0"/>
-          </a:p>
-          <a:p>
-            <a:r>
-              <a:rPr lang="en-US" dirty="0"/>
-              <a:t>“Grammar makes language expressive. A language consisting of words and no grammar (statement = word) expresses only as many ideas as there are words. By specifying how words are combined in statements, a grammar expands a language’s scope. This book is about grammatical rules for creating perceivable graphs, or what we call graphics. The grammar of graphics takes us beyond a limited set of charts (words) to an almost unlimited world of graphical forms (statement).”</a:t>
-            </a:r>
-          </a:p>
-        </p:txBody>
-      </p:sp>
-    </p:spTree>
-    <p:extLst>
-      <p:ext uri="{BB962C8B-B14F-4D97-AF65-F5344CB8AC3E}">
-        <p14:creationId xmlns:p14="http://schemas.microsoft.com/office/powerpoint/2010/main" val="1897466452"/>
       </p:ext>
     </p:extLst>
   </p:cSld>
@@ -43403,7 +43703,31 @@
 </p:tagLst>
 </file>
 
+<file path=ppt/tags/tag18.xml><?xml version="1.0" encoding="utf-8"?>
+<p:tagLst xmlns:a="http://schemas.openxmlformats.org/drawingml/2006/main" xmlns:r="http://schemas.openxmlformats.org/officeDocument/2006/relationships" xmlns:p="http://schemas.openxmlformats.org/presentationml/2006/main">
+  <p:tag name="THINKCELLSHAPEDONOTDELETE" val="thinkcellActiveDocDoNotDelete"/>
+</p:tagLst>
+</file>
+
+<file path=ppt/tags/tag19.xml><?xml version="1.0" encoding="utf-8"?>
+<p:tagLst xmlns:a="http://schemas.openxmlformats.org/drawingml/2006/main" xmlns:r="http://schemas.openxmlformats.org/officeDocument/2006/relationships" xmlns:p="http://schemas.openxmlformats.org/presentationml/2006/main">
+  <p:tag name="THINKCELLSHAPEDONOTDELETE" val="thinkcellActiveDocDoNotDelete"/>
+</p:tagLst>
+</file>
+
 <file path=ppt/tags/tag2.xml><?xml version="1.0" encoding="utf-8"?>
+<p:tagLst xmlns:a="http://schemas.openxmlformats.org/drawingml/2006/main" xmlns:r="http://schemas.openxmlformats.org/officeDocument/2006/relationships" xmlns:p="http://schemas.openxmlformats.org/presentationml/2006/main">
+  <p:tag name="THINKCELLSHAPEDONOTDELETE" val="thinkcellActiveDocDoNotDelete"/>
+</p:tagLst>
+</file>
+
+<file path=ppt/tags/tag20.xml><?xml version="1.0" encoding="utf-8"?>
+<p:tagLst xmlns:a="http://schemas.openxmlformats.org/drawingml/2006/main" xmlns:r="http://schemas.openxmlformats.org/officeDocument/2006/relationships" xmlns:p="http://schemas.openxmlformats.org/presentationml/2006/main">
+  <p:tag name="THINKCELLSHAPEDONOTDELETE" val="thinkcellActiveDocDoNotDelete"/>
+</p:tagLst>
+</file>
+
+<file path=ppt/tags/tag21.xml><?xml version="1.0" encoding="utf-8"?>
 <p:tagLst xmlns:a="http://schemas.openxmlformats.org/drawingml/2006/main" xmlns:r="http://schemas.openxmlformats.org/officeDocument/2006/relationships" xmlns:p="http://schemas.openxmlformats.org/presentationml/2006/main">
   <p:tag name="THINKCELLSHAPEDONOTDELETE" val="thinkcellActiveDocDoNotDelete"/>
 </p:tagLst>
@@ -44051,6 +44375,12 @@
 </file>
 
 <file path=customXml/item2.xml><?xml version="1.0" encoding="utf-8"?>
+<p:properties xmlns:p="http://schemas.microsoft.com/office/2006/metadata/properties" xmlns:xsi="http://www.w3.org/2001/XMLSchema-instance" xmlns:pc="http://schemas.microsoft.com/office/infopath/2007/PartnerControls">
+  <documentManagement/>
+</p:properties>
+</file>
+
+<file path=customXml/item3.xml><?xml version="1.0" encoding="utf-8"?>
 <ct:contentTypeSchema xmlns:ct="http://schemas.microsoft.com/office/2006/metadata/contentType" xmlns:ma="http://schemas.microsoft.com/office/2006/metadata/properties/metaAttributes" ct:_="" ma:_="" ma:contentTypeName="Document" ma:contentTypeID="0x0101001DDE9FF7DD783645B0356953406FF300" ma:contentTypeVersion="13" ma:contentTypeDescription="Create a new document." ma:contentTypeScope="" ma:versionID="23314726fa03d12f6e0ab202b4990644">
   <xsd:schema xmlns:xsd="http://www.w3.org/2001/XMLSchema" xmlns:xs="http://www.w3.org/2001/XMLSchema" xmlns:p="http://schemas.microsoft.com/office/2006/metadata/properties" xmlns:ns2="17ad0721-24bc-4efd-a663-50a5116860f0" xmlns:ns3="e71b4a6e-04aa-446a-86bc-01960ca68683" targetNamespace="http://schemas.microsoft.com/office/2006/metadata/properties" ma:root="true" ma:fieldsID="af66dca9845b66082e2d8682648ae673" ns2:_="" ns3:_="">
     <xsd:import namespace="17ad0721-24bc-4efd-a663-50a5116860f0"/>
@@ -44273,12 +44603,6 @@
 </ct:contentTypeSchema>
 </file>
 
-<file path=customXml/item3.xml><?xml version="1.0" encoding="utf-8"?>
-<p:properties xmlns:p="http://schemas.microsoft.com/office/2006/metadata/properties" xmlns:xsi="http://www.w3.org/2001/XMLSchema-instance" xmlns:pc="http://schemas.microsoft.com/office/infopath/2007/PartnerControls">
-  <documentManagement/>
-</p:properties>
-</file>
-
 <file path=customXml/itemProps1.xml><?xml version="1.0" encoding="utf-8"?>
 <ds:datastoreItem xmlns:ds="http://schemas.openxmlformats.org/officeDocument/2006/customXml" ds:itemID="{D438415F-CA52-4AC6-B74C-FE95CEB90D10}">
   <ds:schemaRefs>
@@ -44288,6 +44612,23 @@
 </file>
 
 <file path=customXml/itemProps2.xml><?xml version="1.0" encoding="utf-8"?>
+<ds:datastoreItem xmlns:ds="http://schemas.openxmlformats.org/officeDocument/2006/customXml" ds:itemID="{A19692CD-7339-4E15-8B85-65EB8EAE7D52}">
+  <ds:schemaRefs>
+    <ds:schemaRef ds:uri="http://purl.org/dc/elements/1.1/"/>
+    <ds:schemaRef ds:uri="http://schemas.openxmlformats.org/package/2006/metadata/core-properties"/>
+    <ds:schemaRef ds:uri="e71b4a6e-04aa-446a-86bc-01960ca68683"/>
+    <ds:schemaRef ds:uri="http://schemas.microsoft.com/office/2006/metadata/properties"/>
+    <ds:schemaRef ds:uri="http://schemas.microsoft.com/office/2006/documentManagement/types"/>
+    <ds:schemaRef ds:uri="http://www.w3.org/XML/1998/namespace"/>
+    <ds:schemaRef ds:uri="http://schemas.microsoft.com/office/infopath/2007/PartnerControls"/>
+    <ds:schemaRef ds:uri="http://purl.org/dc/dcmitype/"/>
+    <ds:schemaRef ds:uri="17ad0721-24bc-4efd-a663-50a5116860f0"/>
+    <ds:schemaRef ds:uri="http://purl.org/dc/terms/"/>
+  </ds:schemaRefs>
+</ds:datastoreItem>
+</file>
+
+<file path=customXml/itemProps3.xml><?xml version="1.0" encoding="utf-8"?>
 <ds:datastoreItem xmlns:ds="http://schemas.openxmlformats.org/officeDocument/2006/customXml" ds:itemID="{52D48CF2-1219-4741-A1AE-7F59311613CA}">
   <ds:schemaRefs>
     <ds:schemaRef ds:uri="17ad0721-24bc-4efd-a663-50a5116860f0"/>
@@ -44304,21 +44645,4 @@
     <ds:schemaRef ds:uri="http://www.w3.org/2001/XMLSchema"/>
   </ds:schemaRefs>
 </ds:datastoreItem>
-</file>
-
-<file path=customXml/itemProps3.xml><?xml version="1.0" encoding="utf-8"?>
-<ds:datastoreItem xmlns:ds="http://schemas.openxmlformats.org/officeDocument/2006/customXml" ds:itemID="{A19692CD-7339-4E15-8B85-65EB8EAE7D52}">
-  <ds:schemaRefs>
-    <ds:schemaRef ds:uri="http://purl.org/dc/elements/1.1/"/>
-    <ds:schemaRef ds:uri="http://schemas.openxmlformats.org/package/2006/metadata/core-properties"/>
-    <ds:schemaRef ds:uri="e71b4a6e-04aa-446a-86bc-01960ca68683"/>
-    <ds:schemaRef ds:uri="http://schemas.microsoft.com/office/2006/metadata/properties"/>
-    <ds:schemaRef ds:uri="http://schemas.microsoft.com/office/2006/documentManagement/types"/>
-    <ds:schemaRef ds:uri="http://www.w3.org/XML/1998/namespace"/>
-    <ds:schemaRef ds:uri="http://schemas.microsoft.com/office/infopath/2007/PartnerControls"/>
-    <ds:schemaRef ds:uri="http://purl.org/dc/dcmitype/"/>
-    <ds:schemaRef ds:uri="17ad0721-24bc-4efd-a663-50a5116860f0"/>
-    <ds:schemaRef ds:uri="http://purl.org/dc/terms/"/>
-  </ds:schemaRefs>
-</ds:datastoreItem>
 </file>
</xml_diff>